<commit_message>
Update presentation: replaced with Natural Language Process(NLP)_AI574_Team11.pptx
</commit_message>
<xml_diff>
--- a/Natural Language Process(NLP)_AI574_Team11.pptx
+++ b/Natural Language Process(NLP)_AI574_Team11.pptx
@@ -2077,7 +2077,7 @@
           <a:lstStyle/>
           <a:p>
             <a:r>
-              <a:rPr lang="en-US">
+              <a:rPr lang="en-US" dirty="0">
                 <a:latin typeface="Franklin Gothic Medium"/>
               </a:rPr>
               <a:t>Model selection and parameters</a:t>
@@ -2101,18 +2101,444 @@
             <p:ph sz="half" idx="1"/>
           </p:nvPr>
         </p:nvSpPr>
-        <p:spPr/>
+        <p:spPr>
+          <a:xfrm>
+            <a:off x="67733" y="1154411"/>
+            <a:ext cx="10515599" cy="5517322"/>
+          </a:xfrm>
+        </p:spPr>
         <p:txBody>
           <a:bodyPr/>
           <a:lstStyle/>
           <a:p>
-            <a:r>
-              <a:rPr lang="en-US"/>
-              <a:t>Normalization, regularization, data augmentation, layers, activation functions, Tuning, </a:t>
-            </a:r>
+            <a:pPr marL="0" indent="0">
+              <a:buNone/>
+            </a:pPr>
+            <a:r>
+              <a:rPr lang="en-US" sz="1200" b="1" dirty="0">
+                <a:latin typeface="Arial" panose="020B0604020202020204" pitchFamily="34" charset="0"/>
+                <a:cs typeface="Arial" panose="020B0604020202020204" pitchFamily="34" charset="0"/>
+              </a:rPr>
+              <a:t>1. Statistical NLP Model</a:t>
+            </a:r>
+            <a:r>
+              <a:rPr lang="en-US" sz="1200" dirty="0">
+                <a:latin typeface="Arial" panose="020B0604020202020204" pitchFamily="34" charset="0"/>
+                <a:cs typeface="Arial" panose="020B0604020202020204" pitchFamily="34" charset="0"/>
+              </a:rPr>
+              <a:t> – </a:t>
+            </a:r>
+            <a:r>
+              <a:rPr lang="en-US" sz="1200" b="1" dirty="0">
+                <a:latin typeface="Arial" panose="020B0604020202020204" pitchFamily="34" charset="0"/>
+                <a:cs typeface="Arial" panose="020B0604020202020204" pitchFamily="34" charset="0"/>
+              </a:rPr>
+              <a:t>TF-IDF + Logistic Regression</a:t>
+            </a:r>
+            <a:endParaRPr lang="en-US" sz="1200" dirty="0">
+              <a:latin typeface="Arial" panose="020B0604020202020204" pitchFamily="34" charset="0"/>
+              <a:cs typeface="Arial" panose="020B0604020202020204" pitchFamily="34" charset="0"/>
+            </a:endParaRPr>
+          </a:p>
+          <a:p>
+            <a:pPr lvl="1"/>
+            <a:r>
+              <a:rPr lang="en-US" sz="1200" b="1" dirty="0">
+                <a:latin typeface="Arial" panose="020B0604020202020204" pitchFamily="34" charset="0"/>
+                <a:cs typeface="Arial" panose="020B0604020202020204" pitchFamily="34" charset="0"/>
+              </a:rPr>
+              <a:t>Vectorization:</a:t>
+            </a:r>
+            <a:r>
+              <a:rPr lang="en-US" sz="1200" dirty="0">
+                <a:latin typeface="Arial" panose="020B0604020202020204" pitchFamily="34" charset="0"/>
+                <a:cs typeface="Arial" panose="020B0604020202020204" pitchFamily="34" charset="0"/>
+              </a:rPr>
+              <a:t> TF-IDF with unigrams and bigrams (</a:t>
+            </a:r>
+            <a:r>
+              <a:rPr lang="en-US" sz="1200" dirty="0" err="1">
+                <a:latin typeface="Arial" panose="020B0604020202020204" pitchFamily="34" charset="0"/>
+                <a:cs typeface="Arial" panose="020B0604020202020204" pitchFamily="34" charset="0"/>
+              </a:rPr>
+              <a:t>ngram_range</a:t>
+            </a:r>
+            <a:r>
+              <a:rPr lang="en-US" sz="1200" dirty="0">
+                <a:latin typeface="Arial" panose="020B0604020202020204" pitchFamily="34" charset="0"/>
+                <a:cs typeface="Arial" panose="020B0604020202020204" pitchFamily="34" charset="0"/>
+              </a:rPr>
+              <a:t>=(1,2))</a:t>
+            </a:r>
+          </a:p>
+          <a:p>
+            <a:pPr lvl="1"/>
+            <a:r>
+              <a:rPr lang="en-US" sz="1200" b="1" dirty="0">
+                <a:latin typeface="Arial" panose="020B0604020202020204" pitchFamily="34" charset="0"/>
+                <a:cs typeface="Arial" panose="020B0604020202020204" pitchFamily="34" charset="0"/>
+              </a:rPr>
+              <a:t>Max Features:</a:t>
+            </a:r>
+            <a:r>
+              <a:rPr lang="en-US" sz="1200" dirty="0">
+                <a:latin typeface="Arial" panose="020B0604020202020204" pitchFamily="34" charset="0"/>
+                <a:cs typeface="Arial" panose="020B0604020202020204" pitchFamily="34" charset="0"/>
+              </a:rPr>
+              <a:t> 30,000</a:t>
+            </a:r>
+          </a:p>
+          <a:p>
+            <a:pPr lvl="1"/>
+            <a:r>
+              <a:rPr lang="en-US" sz="1200" b="1" dirty="0">
+                <a:latin typeface="Arial" panose="020B0604020202020204" pitchFamily="34" charset="0"/>
+                <a:cs typeface="Arial" panose="020B0604020202020204" pitchFamily="34" charset="0"/>
+              </a:rPr>
+              <a:t>Stop Words:</a:t>
+            </a:r>
+            <a:r>
+              <a:rPr lang="en-US" sz="1200" dirty="0">
+                <a:latin typeface="Arial" panose="020B0604020202020204" pitchFamily="34" charset="0"/>
+                <a:cs typeface="Arial" panose="020B0604020202020204" pitchFamily="34" charset="0"/>
+              </a:rPr>
+              <a:t> English</a:t>
+            </a:r>
+          </a:p>
+          <a:p>
+            <a:pPr lvl="1"/>
+            <a:r>
+              <a:rPr lang="en-US" sz="1200" b="1" dirty="0">
+                <a:latin typeface="Arial" panose="020B0604020202020204" pitchFamily="34" charset="0"/>
+                <a:cs typeface="Arial" panose="020B0604020202020204" pitchFamily="34" charset="0"/>
+              </a:rPr>
+              <a:t>Classifier:</a:t>
+            </a:r>
+            <a:r>
+              <a:rPr lang="en-US" sz="1200" dirty="0">
+                <a:latin typeface="Arial" panose="020B0604020202020204" pitchFamily="34" charset="0"/>
+                <a:cs typeface="Arial" panose="020B0604020202020204" pitchFamily="34" charset="0"/>
+              </a:rPr>
+              <a:t> Logistic Regression</a:t>
+            </a:r>
+          </a:p>
+          <a:p>
+            <a:pPr lvl="2"/>
+            <a:r>
+              <a:rPr lang="en-US" sz="1200" b="1" dirty="0">
+                <a:latin typeface="Arial" panose="020B0604020202020204" pitchFamily="34" charset="0"/>
+                <a:cs typeface="Arial" panose="020B0604020202020204" pitchFamily="34" charset="0"/>
+              </a:rPr>
+              <a:t>Solver:</a:t>
+            </a:r>
+            <a:r>
+              <a:rPr lang="en-US" sz="1200" dirty="0">
+                <a:latin typeface="Arial" panose="020B0604020202020204" pitchFamily="34" charset="0"/>
+                <a:cs typeface="Arial" panose="020B0604020202020204" pitchFamily="34" charset="0"/>
+              </a:rPr>
+              <a:t> </a:t>
+            </a:r>
+            <a:r>
+              <a:rPr lang="en-US" sz="1200" dirty="0" err="1">
+                <a:latin typeface="Arial" panose="020B0604020202020204" pitchFamily="34" charset="0"/>
+                <a:cs typeface="Arial" panose="020B0604020202020204" pitchFamily="34" charset="0"/>
+              </a:rPr>
+              <a:t>liblinear</a:t>
+            </a:r>
+            <a:endParaRPr lang="en-US" sz="1200" dirty="0">
+              <a:latin typeface="Arial" panose="020B0604020202020204" pitchFamily="34" charset="0"/>
+              <a:cs typeface="Arial" panose="020B0604020202020204" pitchFamily="34" charset="0"/>
+            </a:endParaRPr>
+          </a:p>
+          <a:p>
+            <a:pPr lvl="2"/>
+            <a:r>
+              <a:rPr lang="en-US" sz="1200" b="1" dirty="0">
+                <a:latin typeface="Arial" panose="020B0604020202020204" pitchFamily="34" charset="0"/>
+                <a:cs typeface="Arial" panose="020B0604020202020204" pitchFamily="34" charset="0"/>
+              </a:rPr>
+              <a:t>Class Weight:</a:t>
+            </a:r>
+            <a:r>
+              <a:rPr lang="en-US" sz="1200" dirty="0">
+                <a:latin typeface="Arial" panose="020B0604020202020204" pitchFamily="34" charset="0"/>
+                <a:cs typeface="Arial" panose="020B0604020202020204" pitchFamily="34" charset="0"/>
+              </a:rPr>
+              <a:t> balanced to handle imbalance</a:t>
+            </a:r>
+          </a:p>
+          <a:p>
+            <a:pPr lvl="2"/>
+            <a:r>
+              <a:rPr lang="en-US" sz="1200" b="1" dirty="0">
+                <a:latin typeface="Arial" panose="020B0604020202020204" pitchFamily="34" charset="0"/>
+                <a:cs typeface="Arial" panose="020B0604020202020204" pitchFamily="34" charset="0"/>
+              </a:rPr>
+              <a:t>Max Iterations:</a:t>
+            </a:r>
+            <a:r>
+              <a:rPr lang="en-US" sz="1200" dirty="0">
+                <a:latin typeface="Arial" panose="020B0604020202020204" pitchFamily="34" charset="0"/>
+                <a:cs typeface="Arial" panose="020B0604020202020204" pitchFamily="34" charset="0"/>
+              </a:rPr>
+              <a:t> 1000</a:t>
+            </a:r>
+          </a:p>
+          <a:p>
+            <a:pPr lvl="1"/>
+            <a:r>
+              <a:rPr lang="en-US" sz="1200" b="1" dirty="0">
+                <a:latin typeface="Arial" panose="020B0604020202020204" pitchFamily="34" charset="0"/>
+                <a:cs typeface="Arial" panose="020B0604020202020204" pitchFamily="34" charset="0"/>
+              </a:rPr>
+              <a:t>Imbalance Handling:</a:t>
+            </a:r>
+            <a:r>
+              <a:rPr lang="en-US" sz="1200" dirty="0">
+                <a:latin typeface="Arial" panose="020B0604020202020204" pitchFamily="34" charset="0"/>
+                <a:cs typeface="Arial" panose="020B0604020202020204" pitchFamily="34" charset="0"/>
+              </a:rPr>
+              <a:t> SMOTE for oversampling minority classes</a:t>
+            </a:r>
+          </a:p>
+          <a:p>
+            <a:pPr lvl="1"/>
+            <a:endParaRPr lang="en-US" sz="1200" dirty="0">
+              <a:latin typeface="Arial" panose="020B0604020202020204" pitchFamily="34" charset="0"/>
+              <a:cs typeface="Arial" panose="020B0604020202020204" pitchFamily="34" charset="0"/>
+            </a:endParaRPr>
+          </a:p>
+          <a:p>
+            <a:pPr marL="0" indent="0">
+              <a:buNone/>
+            </a:pPr>
+            <a:r>
+              <a:rPr lang="en-US" sz="1200" b="1" dirty="0"/>
+              <a:t>2. Neural NLP Model</a:t>
+            </a:r>
+            <a:r>
+              <a:rPr lang="en-US" sz="1200" dirty="0"/>
+              <a:t> – </a:t>
+            </a:r>
+            <a:r>
+              <a:rPr lang="en-US" sz="1200" b="1" dirty="0" err="1"/>
+              <a:t>FinBERT</a:t>
+            </a:r>
+            <a:r>
+              <a:rPr lang="en-US" sz="1200" b="1" dirty="0"/>
+              <a:t> (Transformer)</a:t>
+            </a:r>
+            <a:endParaRPr lang="en-US" sz="1200" dirty="0"/>
+          </a:p>
+          <a:p>
+            <a:pPr lvl="1"/>
+            <a:r>
+              <a:rPr lang="en-US" sz="1200" b="1" dirty="0"/>
+              <a:t>Pre-trained model:</a:t>
+            </a:r>
+            <a:r>
+              <a:rPr lang="en-US" sz="1200" dirty="0"/>
+              <a:t> </a:t>
+            </a:r>
+            <a:r>
+              <a:rPr lang="en-US" sz="1200" dirty="0" err="1"/>
+              <a:t>yiyanghkust</a:t>
+            </a:r>
+            <a:r>
+              <a:rPr lang="en-US" sz="1200" dirty="0"/>
+              <a:t>/</a:t>
+            </a:r>
+            <a:r>
+              <a:rPr lang="en-US" sz="1200" dirty="0" err="1"/>
+              <a:t>finbert</a:t>
+            </a:r>
+            <a:r>
+              <a:rPr lang="en-US" sz="1200" dirty="0"/>
+              <a:t>-tone</a:t>
+            </a:r>
+          </a:p>
+          <a:p>
+            <a:pPr lvl="1"/>
+            <a:r>
+              <a:rPr lang="en-US" sz="1200" b="1" dirty="0"/>
+              <a:t>Task:</a:t>
+            </a:r>
+            <a:r>
+              <a:rPr lang="en-US" sz="1200" dirty="0"/>
+              <a:t> Multi-class sentiment classification (Negative, Neutral, Positive)</a:t>
+            </a:r>
+          </a:p>
+          <a:p>
+            <a:pPr lvl="1"/>
+            <a:r>
+              <a:rPr lang="en-US" sz="1200" b="1" dirty="0"/>
+              <a:t>Pipeline:</a:t>
+            </a:r>
+            <a:r>
+              <a:rPr lang="en-US" sz="1200" dirty="0"/>
+              <a:t> Hugging Face pipeline("sentiment-analysis")</a:t>
+            </a:r>
+          </a:p>
+          <a:p>
+            <a:pPr lvl="1"/>
+            <a:r>
+              <a:rPr lang="en-US" sz="1200" b="1" dirty="0"/>
+              <a:t>Input:</a:t>
+            </a:r>
+            <a:r>
+              <a:rPr lang="en-US" sz="1200" dirty="0"/>
+              <a:t> Raw financial texts</a:t>
+            </a:r>
+          </a:p>
+          <a:p>
+            <a:pPr lvl="1"/>
+            <a:r>
+              <a:rPr lang="en-US" sz="1200" b="1" dirty="0"/>
+              <a:t>Output:</a:t>
+            </a:r>
+            <a:r>
+              <a:rPr lang="en-US" sz="1200" dirty="0"/>
+              <a:t> Predicted sentiment label per text</a:t>
+            </a:r>
+          </a:p>
+          <a:p>
+            <a:pPr lvl="1"/>
+            <a:endParaRPr lang="en-US" sz="1200" dirty="0"/>
+          </a:p>
+          <a:p>
+            <a:pPr lvl="1"/>
+            <a:endParaRPr lang="en-US" sz="1200" dirty="0"/>
+          </a:p>
+          <a:p>
+            <a:pPr lvl="1"/>
+            <a:endParaRPr lang="en-US" sz="1200" dirty="0"/>
+          </a:p>
+          <a:p>
+            <a:pPr marL="457200" lvl="1" indent="0">
+              <a:buNone/>
+            </a:pPr>
+            <a:endParaRPr lang="en-US" sz="1200" dirty="0"/>
+          </a:p>
+          <a:p>
+            <a:pPr marL="0" indent="0">
+              <a:buNone/>
+            </a:pPr>
+            <a:r>
+              <a:rPr lang="en-US" sz="1200" b="1" dirty="0">
+                <a:latin typeface="Arial" panose="020B0604020202020204" pitchFamily="34" charset="0"/>
+                <a:cs typeface="Arial" panose="020B0604020202020204" pitchFamily="34" charset="0"/>
+              </a:rPr>
+              <a:t>3. Rationale for Selection:</a:t>
+            </a:r>
+            <a:endParaRPr lang="en-US" sz="1200" dirty="0">
+              <a:latin typeface="Arial" panose="020B0604020202020204" pitchFamily="34" charset="0"/>
+              <a:cs typeface="Arial" panose="020B0604020202020204" pitchFamily="34" charset="0"/>
+            </a:endParaRPr>
+          </a:p>
+          <a:p>
+            <a:pPr lvl="1"/>
+            <a:r>
+              <a:rPr lang="en-US" sz="1200" dirty="0">
+                <a:latin typeface="Arial" panose="020B0604020202020204" pitchFamily="34" charset="0"/>
+                <a:cs typeface="Arial" panose="020B0604020202020204" pitchFamily="34" charset="0"/>
+              </a:rPr>
+              <a:t>Logistic Regression: Simple, interpretable baseline for large-scale text data.</a:t>
+            </a:r>
+          </a:p>
+          <a:p>
+            <a:pPr lvl="1"/>
+            <a:r>
+              <a:rPr lang="en-US" sz="1200" dirty="0" err="1">
+                <a:latin typeface="Arial" panose="020B0604020202020204" pitchFamily="34" charset="0"/>
+                <a:cs typeface="Arial" panose="020B0604020202020204" pitchFamily="34" charset="0"/>
+              </a:rPr>
+              <a:t>FinBERT</a:t>
+            </a:r>
+            <a:r>
+              <a:rPr lang="en-US" sz="1200" dirty="0">
+                <a:latin typeface="Arial" panose="020B0604020202020204" pitchFamily="34" charset="0"/>
+                <a:cs typeface="Arial" panose="020B0604020202020204" pitchFamily="34" charset="0"/>
+              </a:rPr>
+              <a:t>: Captures domain-specific nuances and contextual semantics not captured by statistical models.</a:t>
+            </a:r>
+          </a:p>
+          <a:p>
+            <a:pPr marL="457200" lvl="1" indent="0">
+              <a:buNone/>
+            </a:pPr>
+            <a:endParaRPr lang="en-US" sz="1200" dirty="0"/>
+          </a:p>
+          <a:p>
+            <a:pPr marL="0" indent="0">
+              <a:buNone/>
+            </a:pPr>
+            <a:endParaRPr lang="en-US" sz="1600" dirty="0">
+              <a:latin typeface="Arial" panose="020B0604020202020204" pitchFamily="34" charset="0"/>
+              <a:cs typeface="Arial" panose="020B0604020202020204" pitchFamily="34" charset="0"/>
+            </a:endParaRPr>
           </a:p>
         </p:txBody>
       </p:sp>
+      <p:pic>
+        <p:nvPicPr>
+          <p:cNvPr id="5" name="Picture 4">
+            <a:extLst>
+              <a:ext uri="{FF2B5EF4-FFF2-40B4-BE49-F238E27FC236}">
+                <a16:creationId xmlns:a16="http://schemas.microsoft.com/office/drawing/2014/main" id="{87B99BAB-D386-C5D3-9666-C6DEC3BC6040}"/>
+              </a:ext>
+            </a:extLst>
+          </p:cNvPr>
+          <p:cNvPicPr>
+            <a:picLocks noChangeAspect="1"/>
+          </p:cNvPicPr>
+          <p:nvPr/>
+        </p:nvPicPr>
+        <p:blipFill>
+          <a:blip r:embed="rId2"/>
+          <a:stretch>
+            <a:fillRect/>
+          </a:stretch>
+        </p:blipFill>
+        <p:spPr>
+          <a:xfrm>
+            <a:off x="5805900" y="1391478"/>
+            <a:ext cx="6233700" cy="2194252"/>
+          </a:xfrm>
+          <a:prstGeom prst="rect">
+            <a:avLst/>
+          </a:prstGeom>
+        </p:spPr>
+      </p:pic>
+      <p:pic>
+        <p:nvPicPr>
+          <p:cNvPr id="6" name="Picture 5">
+            <a:extLst>
+              <a:ext uri="{FF2B5EF4-FFF2-40B4-BE49-F238E27FC236}">
+                <a16:creationId xmlns:a16="http://schemas.microsoft.com/office/drawing/2014/main" id="{68879D2F-9537-A192-FB3B-AE58A7B51EB4}"/>
+              </a:ext>
+            </a:extLst>
+          </p:cNvPr>
+          <p:cNvPicPr>
+            <a:picLocks noChangeAspect="1"/>
+          </p:cNvPicPr>
+          <p:nvPr/>
+        </p:nvPicPr>
+        <p:blipFill>
+          <a:blip r:embed="rId3"/>
+          <a:stretch>
+            <a:fillRect/>
+          </a:stretch>
+        </p:blipFill>
+        <p:spPr>
+          <a:xfrm>
+            <a:off x="172426" y="4966990"/>
+            <a:ext cx="6767146" cy="815411"/>
+          </a:xfrm>
+          <a:prstGeom prst="rect">
+            <a:avLst/>
+          </a:prstGeom>
+        </p:spPr>
+      </p:pic>
     </p:spTree>
     <p:extLst>
       <p:ext uri="{BB962C8B-B14F-4D97-AF65-F5344CB8AC3E}">
@@ -2165,7 +2591,7 @@
           <a:lstStyle/>
           <a:p>
             <a:r>
-              <a:rPr lang="en-US">
+              <a:rPr lang="en-US" dirty="0">
                 <a:latin typeface="Franklin Gothic Medium"/>
               </a:rPr>
               <a:t>Network Training – Validation - Testing </a:t>
@@ -2189,15 +2615,425 @@
             <p:ph sz="half" idx="1"/>
           </p:nvPr>
         </p:nvSpPr>
-        <p:spPr/>
+        <p:spPr>
+          <a:xfrm>
+            <a:off x="135468" y="1247545"/>
+            <a:ext cx="10684932" cy="4785485"/>
+          </a:xfrm>
+        </p:spPr>
         <p:txBody>
           <a:bodyPr/>
           <a:lstStyle/>
           <a:p>
-            <a:endParaRPr lang="en-US"/>
+            <a:pPr marL="0" indent="0">
+              <a:buNone/>
+            </a:pPr>
+            <a:r>
+              <a:rPr lang="en-US" sz="1200" b="1" dirty="0">
+                <a:latin typeface="Arial" panose="020B0604020202020204" pitchFamily="34" charset="0"/>
+                <a:cs typeface="Arial" panose="020B0604020202020204" pitchFamily="34" charset="0"/>
+              </a:rPr>
+              <a:t>1. Data Splitting</a:t>
+            </a:r>
+            <a:endParaRPr lang="en-US" sz="1200" dirty="0">
+              <a:latin typeface="Arial" panose="020B0604020202020204" pitchFamily="34" charset="0"/>
+              <a:cs typeface="Arial" panose="020B0604020202020204" pitchFamily="34" charset="0"/>
+            </a:endParaRPr>
+          </a:p>
+          <a:p>
+            <a:pPr lvl="1"/>
+            <a:r>
+              <a:rPr lang="en-US" sz="800" b="1" dirty="0">
+                <a:latin typeface="Arial" panose="020B0604020202020204" pitchFamily="34" charset="0"/>
+                <a:cs typeface="Arial" panose="020B0604020202020204" pitchFamily="34" charset="0"/>
+              </a:rPr>
+              <a:t>Train/Test Split:</a:t>
+            </a:r>
+            <a:r>
+              <a:rPr lang="en-US" sz="800" dirty="0">
+                <a:latin typeface="Arial" panose="020B0604020202020204" pitchFamily="34" charset="0"/>
+                <a:cs typeface="Arial" panose="020B0604020202020204" pitchFamily="34" charset="0"/>
+              </a:rPr>
+              <a:t> 80% training, 20% testing</a:t>
+            </a:r>
+          </a:p>
+          <a:p>
+            <a:pPr lvl="1"/>
+            <a:r>
+              <a:rPr lang="en-US" sz="800" b="1" dirty="0">
+                <a:latin typeface="Arial" panose="020B0604020202020204" pitchFamily="34" charset="0"/>
+                <a:cs typeface="Arial" panose="020B0604020202020204" pitchFamily="34" charset="0"/>
+              </a:rPr>
+              <a:t>Stratified Sampling:</a:t>
+            </a:r>
+            <a:r>
+              <a:rPr lang="en-US" sz="800" dirty="0">
+                <a:latin typeface="Arial" panose="020B0604020202020204" pitchFamily="34" charset="0"/>
+                <a:cs typeface="Arial" panose="020B0604020202020204" pitchFamily="34" charset="0"/>
+              </a:rPr>
+              <a:t> Ensures proportional distribution of Negative, Neutral, and Positive classes</a:t>
+            </a:r>
+          </a:p>
+          <a:p>
+            <a:pPr lvl="1"/>
+            <a:r>
+              <a:rPr lang="en-US" sz="800" b="1" dirty="0">
+                <a:latin typeface="Arial" panose="020B0604020202020204" pitchFamily="34" charset="0"/>
+                <a:cs typeface="Arial" panose="020B0604020202020204" pitchFamily="34" charset="0"/>
+              </a:rPr>
+              <a:t>Sample Size:</a:t>
+            </a:r>
+            <a:endParaRPr lang="en-US" sz="800" dirty="0">
+              <a:latin typeface="Arial" panose="020B0604020202020204" pitchFamily="34" charset="0"/>
+              <a:cs typeface="Arial" panose="020B0604020202020204" pitchFamily="34" charset="0"/>
+            </a:endParaRPr>
+          </a:p>
+          <a:p>
+            <a:pPr lvl="2"/>
+            <a:r>
+              <a:rPr lang="en-US" sz="800" dirty="0">
+                <a:latin typeface="Arial" panose="020B0604020202020204" pitchFamily="34" charset="0"/>
+                <a:cs typeface="Arial" panose="020B0604020202020204" pitchFamily="34" charset="0"/>
+              </a:rPr>
+              <a:t>Training: 3,876 texts</a:t>
+            </a:r>
+          </a:p>
+          <a:p>
+            <a:pPr lvl="2"/>
+            <a:r>
+              <a:rPr lang="en-US" sz="800" dirty="0">
+                <a:latin typeface="Arial" panose="020B0604020202020204" pitchFamily="34" charset="0"/>
+                <a:cs typeface="Arial" panose="020B0604020202020204" pitchFamily="34" charset="0"/>
+              </a:rPr>
+              <a:t>Testing: 969 texts</a:t>
+            </a:r>
+          </a:p>
+          <a:p>
+            <a:endParaRPr lang="en-US" sz="1200" b="1" dirty="0">
+              <a:latin typeface="Arial" panose="020B0604020202020204" pitchFamily="34" charset="0"/>
+              <a:cs typeface="Arial" panose="020B0604020202020204" pitchFamily="34" charset="0"/>
+            </a:endParaRPr>
+          </a:p>
+          <a:p>
+            <a:pPr marL="0" indent="0">
+              <a:buNone/>
+            </a:pPr>
+            <a:r>
+              <a:rPr lang="en-US" sz="1200" b="1" dirty="0">
+                <a:latin typeface="Arial" panose="020B0604020202020204" pitchFamily="34" charset="0"/>
+                <a:cs typeface="Arial" panose="020B0604020202020204" pitchFamily="34" charset="0"/>
+              </a:rPr>
+              <a:t>2. TF-IDF + Logistic Regression</a:t>
+            </a:r>
+            <a:endParaRPr lang="en-US" sz="1200" dirty="0">
+              <a:latin typeface="Arial" panose="020B0604020202020204" pitchFamily="34" charset="0"/>
+              <a:cs typeface="Arial" panose="020B0604020202020204" pitchFamily="34" charset="0"/>
+            </a:endParaRPr>
+          </a:p>
+          <a:p>
+            <a:pPr lvl="1"/>
+            <a:r>
+              <a:rPr lang="en-US" sz="800" b="1" dirty="0">
+                <a:latin typeface="Arial" panose="020B0604020202020204" pitchFamily="34" charset="0"/>
+                <a:cs typeface="Arial" panose="020B0604020202020204" pitchFamily="34" charset="0"/>
+              </a:rPr>
+              <a:t>Training:</a:t>
+            </a:r>
+            <a:r>
+              <a:rPr lang="en-US" sz="800" dirty="0">
+                <a:latin typeface="Arial" panose="020B0604020202020204" pitchFamily="34" charset="0"/>
+                <a:cs typeface="Arial" panose="020B0604020202020204" pitchFamily="34" charset="0"/>
+              </a:rPr>
+              <a:t> Logistic Regression trained on TF-IDF vectors</a:t>
+            </a:r>
+          </a:p>
+          <a:p>
+            <a:pPr lvl="1"/>
+            <a:r>
+              <a:rPr lang="en-US" sz="800" b="1" dirty="0">
+                <a:latin typeface="Arial" panose="020B0604020202020204" pitchFamily="34" charset="0"/>
+                <a:cs typeface="Arial" panose="020B0604020202020204" pitchFamily="34" charset="0"/>
+              </a:rPr>
+              <a:t>Oversampling:</a:t>
+            </a:r>
+            <a:r>
+              <a:rPr lang="en-US" sz="800" dirty="0">
+                <a:latin typeface="Arial" panose="020B0604020202020204" pitchFamily="34" charset="0"/>
+                <a:cs typeface="Arial" panose="020B0604020202020204" pitchFamily="34" charset="0"/>
+              </a:rPr>
+              <a:t> SMOTE is used to balance the class distribution in the training set</a:t>
+            </a:r>
+          </a:p>
+          <a:p>
+            <a:pPr marL="0" indent="0">
+              <a:buNone/>
+            </a:pPr>
+            <a:r>
+              <a:rPr lang="en-US" sz="1200" b="1" dirty="0">
+                <a:latin typeface="Arial" panose="020B0604020202020204" pitchFamily="34" charset="0"/>
+                <a:cs typeface="Arial" panose="020B0604020202020204" pitchFamily="34" charset="0"/>
+              </a:rPr>
+              <a:t>3. </a:t>
+            </a:r>
+            <a:r>
+              <a:rPr lang="en-US" sz="1200" b="1" dirty="0" err="1">
+                <a:latin typeface="Arial" panose="020B0604020202020204" pitchFamily="34" charset="0"/>
+                <a:cs typeface="Arial" panose="020B0604020202020204" pitchFamily="34" charset="0"/>
+              </a:rPr>
+              <a:t>FinBERT</a:t>
+            </a:r>
+            <a:r>
+              <a:rPr lang="en-US" sz="1200" b="1" dirty="0">
+                <a:latin typeface="Arial" panose="020B0604020202020204" pitchFamily="34" charset="0"/>
+                <a:cs typeface="Arial" panose="020B0604020202020204" pitchFamily="34" charset="0"/>
+              </a:rPr>
+              <a:t> (Neural Network)</a:t>
+            </a:r>
+            <a:endParaRPr lang="en-US" sz="1200" dirty="0">
+              <a:latin typeface="Arial" panose="020B0604020202020204" pitchFamily="34" charset="0"/>
+              <a:cs typeface="Arial" panose="020B0604020202020204" pitchFamily="34" charset="0"/>
+            </a:endParaRPr>
+          </a:p>
+          <a:p>
+            <a:pPr lvl="1"/>
+            <a:r>
+              <a:rPr lang="en-US" sz="800" b="1" dirty="0">
+                <a:latin typeface="Arial" panose="020B0604020202020204" pitchFamily="34" charset="0"/>
+                <a:cs typeface="Arial" panose="020B0604020202020204" pitchFamily="34" charset="0"/>
+              </a:rPr>
+              <a:t>Training:</a:t>
+            </a:r>
+            <a:r>
+              <a:rPr lang="en-US" sz="800" dirty="0">
+                <a:latin typeface="Arial" panose="020B0604020202020204" pitchFamily="34" charset="0"/>
+                <a:cs typeface="Arial" panose="020B0604020202020204" pitchFamily="34" charset="0"/>
+              </a:rPr>
+              <a:t> Pre-trained model, fine-tuned for 3-class sentiment</a:t>
+            </a:r>
+          </a:p>
+          <a:p>
+            <a:pPr lvl="1"/>
+            <a:r>
+              <a:rPr lang="en-US" sz="800" b="1" dirty="0">
+                <a:latin typeface="Arial" panose="020B0604020202020204" pitchFamily="34" charset="0"/>
+                <a:cs typeface="Arial" panose="020B0604020202020204" pitchFamily="34" charset="0"/>
+              </a:rPr>
+              <a:t>Validation:</a:t>
+            </a:r>
+            <a:r>
+              <a:rPr lang="en-US" sz="800" dirty="0">
+                <a:latin typeface="Arial" panose="020B0604020202020204" pitchFamily="34" charset="0"/>
+                <a:cs typeface="Arial" panose="020B0604020202020204" pitchFamily="34" charset="0"/>
+              </a:rPr>
+              <a:t> Tested on the same 20% split (pipeline handles tokenization and prediction)</a:t>
+            </a:r>
+          </a:p>
+          <a:p>
+            <a:pPr lvl="1"/>
+            <a:r>
+              <a:rPr lang="en-US" sz="800" b="1" dirty="0">
+                <a:latin typeface="Arial" panose="020B0604020202020204" pitchFamily="34" charset="0"/>
+                <a:cs typeface="Arial" panose="020B0604020202020204" pitchFamily="34" charset="0"/>
+              </a:rPr>
+              <a:t>Advantages:</a:t>
+            </a:r>
+            <a:r>
+              <a:rPr lang="en-US" sz="800" dirty="0">
+                <a:latin typeface="Arial" panose="020B0604020202020204" pitchFamily="34" charset="0"/>
+                <a:cs typeface="Arial" panose="020B0604020202020204" pitchFamily="34" charset="0"/>
+              </a:rPr>
+              <a:t> Captures context and financial jargon</a:t>
+            </a:r>
+          </a:p>
+          <a:p>
+            <a:pPr marL="0" indent="0">
+              <a:buNone/>
+            </a:pPr>
+            <a:endParaRPr lang="en-US" sz="1200" b="1" dirty="0">
+              <a:latin typeface="Arial" panose="020B0604020202020204" pitchFamily="34" charset="0"/>
+              <a:cs typeface="Arial" panose="020B0604020202020204" pitchFamily="34" charset="0"/>
+            </a:endParaRPr>
+          </a:p>
+          <a:p>
+            <a:pPr marL="0" indent="0">
+              <a:buNone/>
+            </a:pPr>
+            <a:endParaRPr lang="en-US" sz="1200" b="1" dirty="0">
+              <a:latin typeface="Arial" panose="020B0604020202020204" pitchFamily="34" charset="0"/>
+              <a:cs typeface="Arial" panose="020B0604020202020204" pitchFamily="34" charset="0"/>
+            </a:endParaRPr>
+          </a:p>
+          <a:p>
+            <a:pPr marL="0" indent="0">
+              <a:buNone/>
+            </a:pPr>
+            <a:endParaRPr lang="en-US" sz="1200" b="1" dirty="0">
+              <a:latin typeface="Arial" panose="020B0604020202020204" pitchFamily="34" charset="0"/>
+              <a:cs typeface="Arial" panose="020B0604020202020204" pitchFamily="34" charset="0"/>
+            </a:endParaRPr>
+          </a:p>
+          <a:p>
+            <a:pPr marL="0" indent="0">
+              <a:buNone/>
+            </a:pPr>
+            <a:r>
+              <a:rPr lang="en-US" sz="1200" b="1" dirty="0">
+                <a:latin typeface="Arial" panose="020B0604020202020204" pitchFamily="34" charset="0"/>
+                <a:cs typeface="Arial" panose="020B0604020202020204" pitchFamily="34" charset="0"/>
+              </a:rPr>
+              <a:t>4. Testing and Evaluation</a:t>
+            </a:r>
+            <a:endParaRPr lang="en-US" sz="1200" dirty="0">
+              <a:latin typeface="Arial" panose="020B0604020202020204" pitchFamily="34" charset="0"/>
+              <a:cs typeface="Arial" panose="020B0604020202020204" pitchFamily="34" charset="0"/>
+            </a:endParaRPr>
+          </a:p>
+          <a:p>
+            <a:pPr lvl="1"/>
+            <a:r>
+              <a:rPr lang="en-US" sz="800" b="1" dirty="0">
+                <a:latin typeface="Arial" panose="020B0604020202020204" pitchFamily="34" charset="0"/>
+                <a:cs typeface="Arial" panose="020B0604020202020204" pitchFamily="34" charset="0"/>
+              </a:rPr>
+              <a:t>Tested on:</a:t>
+            </a:r>
+            <a:r>
+              <a:rPr lang="en-US" sz="800" dirty="0">
+                <a:latin typeface="Arial" panose="020B0604020202020204" pitchFamily="34" charset="0"/>
+                <a:cs typeface="Arial" panose="020B0604020202020204" pitchFamily="34" charset="0"/>
+              </a:rPr>
+              <a:t> 969 unseen samples</a:t>
+            </a:r>
+          </a:p>
+          <a:p>
+            <a:pPr lvl="1"/>
+            <a:r>
+              <a:rPr lang="en-US" sz="800" b="1" dirty="0">
+                <a:latin typeface="Arial" panose="020B0604020202020204" pitchFamily="34" charset="0"/>
+                <a:cs typeface="Arial" panose="020B0604020202020204" pitchFamily="34" charset="0"/>
+              </a:rPr>
+              <a:t>Metrics Evaluated:</a:t>
+            </a:r>
+            <a:r>
+              <a:rPr lang="en-US" sz="800" dirty="0">
+                <a:latin typeface="Arial" panose="020B0604020202020204" pitchFamily="34" charset="0"/>
+                <a:cs typeface="Arial" panose="020B0604020202020204" pitchFamily="34" charset="0"/>
+              </a:rPr>
+              <a:t> Accuracy, F1-score, ROC-AUC, Confusion Matrix</a:t>
+            </a:r>
+          </a:p>
+          <a:p>
+            <a:pPr lvl="1"/>
+            <a:r>
+              <a:rPr lang="en-US" sz="800" b="1" dirty="0">
+                <a:latin typeface="Arial" panose="020B0604020202020204" pitchFamily="34" charset="0"/>
+                <a:cs typeface="Arial" panose="020B0604020202020204" pitchFamily="34" charset="0"/>
+              </a:rPr>
+              <a:t>Visualization:</a:t>
+            </a:r>
+            <a:r>
+              <a:rPr lang="en-US" sz="800" dirty="0">
+                <a:latin typeface="Arial" panose="020B0604020202020204" pitchFamily="34" charset="0"/>
+                <a:cs typeface="Arial" panose="020B0604020202020204" pitchFamily="34" charset="0"/>
+              </a:rPr>
+              <a:t> Class distribution, ROC curves, F1-score comparison</a:t>
+            </a:r>
+          </a:p>
+          <a:p>
+            <a:endParaRPr lang="en-US" dirty="0"/>
           </a:p>
         </p:txBody>
       </p:sp>
+      <p:pic>
+        <p:nvPicPr>
+          <p:cNvPr id="5" name="Picture 4">
+            <a:extLst>
+              <a:ext uri="{FF2B5EF4-FFF2-40B4-BE49-F238E27FC236}">
+                <a16:creationId xmlns:a16="http://schemas.microsoft.com/office/drawing/2014/main" id="{11DD0721-FABF-E7C7-CEAB-C4B2001463E5}"/>
+              </a:ext>
+            </a:extLst>
+          </p:cNvPr>
+          <p:cNvPicPr>
+            <a:picLocks noChangeAspect="1"/>
+          </p:cNvPicPr>
+          <p:nvPr/>
+        </p:nvPicPr>
+        <p:blipFill>
+          <a:blip r:embed="rId2"/>
+          <a:stretch>
+            <a:fillRect/>
+          </a:stretch>
+        </p:blipFill>
+        <p:spPr>
+          <a:xfrm>
+            <a:off x="5805913" y="1391478"/>
+            <a:ext cx="6081287" cy="1066892"/>
+          </a:xfrm>
+          <a:prstGeom prst="rect">
+            <a:avLst/>
+          </a:prstGeom>
+        </p:spPr>
+      </p:pic>
+      <p:pic>
+        <p:nvPicPr>
+          <p:cNvPr id="7" name="Picture 6">
+            <a:extLst>
+              <a:ext uri="{FF2B5EF4-FFF2-40B4-BE49-F238E27FC236}">
+                <a16:creationId xmlns:a16="http://schemas.microsoft.com/office/drawing/2014/main" id="{73EDBB16-E12D-03B7-6A56-CB53A0AEBC04}"/>
+              </a:ext>
+            </a:extLst>
+          </p:cNvPr>
+          <p:cNvPicPr>
+            <a:picLocks noChangeAspect="1"/>
+          </p:cNvPicPr>
+          <p:nvPr/>
+        </p:nvPicPr>
+        <p:blipFill>
+          <a:blip r:embed="rId3"/>
+          <a:stretch>
+            <a:fillRect/>
+          </a:stretch>
+        </p:blipFill>
+        <p:spPr>
+          <a:xfrm>
+            <a:off x="4853400" y="2561534"/>
+            <a:ext cx="6233700" cy="1150720"/>
+          </a:xfrm>
+          <a:prstGeom prst="rect">
+            <a:avLst/>
+          </a:prstGeom>
+        </p:spPr>
+      </p:pic>
+      <p:pic>
+        <p:nvPicPr>
+          <p:cNvPr id="9" name="Picture 8">
+            <a:extLst>
+              <a:ext uri="{FF2B5EF4-FFF2-40B4-BE49-F238E27FC236}">
+                <a16:creationId xmlns:a16="http://schemas.microsoft.com/office/drawing/2014/main" id="{C804B63F-CA66-B66B-FAC4-44BC852751CE}"/>
+              </a:ext>
+            </a:extLst>
+          </p:cNvPr>
+          <p:cNvPicPr>
+            <a:picLocks noChangeAspect="1"/>
+          </p:cNvPicPr>
+          <p:nvPr/>
+        </p:nvPicPr>
+        <p:blipFill>
+          <a:blip r:embed="rId4"/>
+          <a:stretch>
+            <a:fillRect/>
+          </a:stretch>
+        </p:blipFill>
+        <p:spPr>
+          <a:xfrm>
+            <a:off x="304800" y="4148678"/>
+            <a:ext cx="6782388" cy="723963"/>
+          </a:xfrm>
+          <a:prstGeom prst="rect">
+            <a:avLst/>
+          </a:prstGeom>
+        </p:spPr>
+      </p:pic>
     </p:spTree>
     <p:extLst>
       <p:ext uri="{BB962C8B-B14F-4D97-AF65-F5344CB8AC3E}">
@@ -2250,7 +3086,7 @@
           <a:lstStyle/>
           <a:p>
             <a:r>
-              <a:rPr lang="en-US"/>
+              <a:rPr lang="en-US" dirty="0"/>
               <a:t>Evaluations – Performance – comparing </a:t>
             </a:r>
           </a:p>
@@ -2258,35 +3094,431 @@
       </p:sp>
       <p:sp>
         <p:nvSpPr>
-          <p:cNvPr id="3" name="Content Placeholder 2">
+          <p:cNvPr id="5" name="TextBox 4">
             <a:extLst>
               <a:ext uri="{FF2B5EF4-FFF2-40B4-BE49-F238E27FC236}">
-                <a16:creationId xmlns:a16="http://schemas.microsoft.com/office/drawing/2014/main" id="{291EF1D2-968A-7F4D-A49F-7315A1082BDD}"/>
+                <a16:creationId xmlns:a16="http://schemas.microsoft.com/office/drawing/2014/main" id="{DE1D5B54-8631-2A13-F89E-6EBC44C4ABD3}"/>
               </a:ext>
             </a:extLst>
           </p:cNvPr>
-          <p:cNvSpPr>
-            <a:spLocks noGrp="1"/>
-          </p:cNvSpPr>
-          <p:nvPr>
-            <p:ph sz="half" idx="1"/>
-          </p:nvPr>
+          <p:cNvSpPr txBox="1"/>
+          <p:nvPr/>
         </p:nvSpPr>
-        <p:spPr/>
+        <p:spPr>
+          <a:xfrm>
+            <a:off x="203199" y="1136514"/>
+            <a:ext cx="11565467" cy="5047536"/>
+          </a:xfrm>
+          <a:prstGeom prst="rect">
+            <a:avLst/>
+          </a:prstGeom>
+          <a:noFill/>
+        </p:spPr>
         <p:txBody>
-          <a:bodyPr/>
+          <a:bodyPr wrap="square">
+            <a:spAutoFit/>
+          </a:bodyPr>
           <a:lstStyle/>
           <a:p>
-            <a:r>
-              <a:rPr lang="en-US"/>
-              <a:t>Baseline models</a:t>
-            </a:r>
-          </a:p>
-          <a:p>
-            <a:endParaRPr lang="en-US"/>
+            <a:pPr>
+              <a:buNone/>
+            </a:pPr>
+            <a:r>
+              <a:rPr lang="en-US" sz="1400" b="1" dirty="0">
+                <a:latin typeface="Arial" panose="020B0604020202020204" pitchFamily="34" charset="0"/>
+                <a:cs typeface="Arial" panose="020B0604020202020204" pitchFamily="34" charset="0"/>
+              </a:rPr>
+              <a:t>1. Logistic Regression (TF-IDF + LR)</a:t>
+            </a:r>
+            <a:endParaRPr lang="en-US" sz="1400" dirty="0">
+              <a:latin typeface="Arial" panose="020B0604020202020204" pitchFamily="34" charset="0"/>
+              <a:cs typeface="Arial" panose="020B0604020202020204" pitchFamily="34" charset="0"/>
+            </a:endParaRPr>
+          </a:p>
+          <a:p>
+            <a:pPr lvl="1">
+              <a:buFont typeface="Arial" panose="020B0604020202020204" pitchFamily="34" charset="0"/>
+              <a:buChar char="•"/>
+            </a:pPr>
+            <a:r>
+              <a:rPr lang="en-US" sz="1400" b="1" dirty="0">
+                <a:latin typeface="Arial" panose="020B0604020202020204" pitchFamily="34" charset="0"/>
+                <a:cs typeface="Arial" panose="020B0604020202020204" pitchFamily="34" charset="0"/>
+              </a:rPr>
+              <a:t>Accuracy:</a:t>
+            </a:r>
+            <a:r>
+              <a:rPr lang="en-US" sz="1400" dirty="0">
+                <a:latin typeface="Arial" panose="020B0604020202020204" pitchFamily="34" charset="0"/>
+                <a:cs typeface="Arial" panose="020B0604020202020204" pitchFamily="34" charset="0"/>
+              </a:rPr>
+              <a:t> 73.17%</a:t>
+            </a:r>
+          </a:p>
+          <a:p>
+            <a:pPr lvl="1">
+              <a:buFont typeface="Arial" panose="020B0604020202020204" pitchFamily="34" charset="0"/>
+              <a:buChar char="•"/>
+            </a:pPr>
+            <a:r>
+              <a:rPr lang="en-US" sz="1400" b="1" dirty="0">
+                <a:latin typeface="Arial" panose="020B0604020202020204" pitchFamily="34" charset="0"/>
+                <a:cs typeface="Arial" panose="020B0604020202020204" pitchFamily="34" charset="0"/>
+              </a:rPr>
+              <a:t>ROC-AUC:</a:t>
+            </a:r>
+            <a:r>
+              <a:rPr lang="en-US" sz="1400" dirty="0">
+                <a:latin typeface="Arial" panose="020B0604020202020204" pitchFamily="34" charset="0"/>
+                <a:cs typeface="Arial" panose="020B0604020202020204" pitchFamily="34" charset="0"/>
+              </a:rPr>
+              <a:t> 0.859</a:t>
+            </a:r>
+          </a:p>
+          <a:p>
+            <a:pPr lvl="1">
+              <a:buFont typeface="Arial" panose="020B0604020202020204" pitchFamily="34" charset="0"/>
+              <a:buChar char="•"/>
+            </a:pPr>
+            <a:r>
+              <a:rPr lang="en-US" sz="1400" b="1" dirty="0">
+                <a:latin typeface="Arial" panose="020B0604020202020204" pitchFamily="34" charset="0"/>
+                <a:cs typeface="Arial" panose="020B0604020202020204" pitchFamily="34" charset="0"/>
+              </a:rPr>
+              <a:t>F1-Scores per Class:</a:t>
+            </a:r>
+            <a:endParaRPr lang="en-US" sz="1400" dirty="0">
+              <a:latin typeface="Arial" panose="020B0604020202020204" pitchFamily="34" charset="0"/>
+              <a:cs typeface="Arial" panose="020B0604020202020204" pitchFamily="34" charset="0"/>
+            </a:endParaRPr>
+          </a:p>
+          <a:p>
+            <a:pPr marL="1200150" lvl="2" indent="-285750">
+              <a:buFont typeface="Arial" panose="020B0604020202020204" pitchFamily="34" charset="0"/>
+              <a:buChar char="•"/>
+            </a:pPr>
+            <a:r>
+              <a:rPr lang="en-US" sz="1400" dirty="0">
+                <a:latin typeface="Arial" panose="020B0604020202020204" pitchFamily="34" charset="0"/>
+                <a:cs typeface="Arial" panose="020B0604020202020204" pitchFamily="34" charset="0"/>
+              </a:rPr>
+              <a:t>Negative: 0.606</a:t>
+            </a:r>
+          </a:p>
+          <a:p>
+            <a:pPr marL="1200150" lvl="2" indent="-285750">
+              <a:buFont typeface="Arial" panose="020B0604020202020204" pitchFamily="34" charset="0"/>
+              <a:buChar char="•"/>
+            </a:pPr>
+            <a:r>
+              <a:rPr lang="en-US" sz="1400" dirty="0">
+                <a:latin typeface="Arial" panose="020B0604020202020204" pitchFamily="34" charset="0"/>
+                <a:cs typeface="Arial" panose="020B0604020202020204" pitchFamily="34" charset="0"/>
+              </a:rPr>
+              <a:t>Neutral: 0.822</a:t>
+            </a:r>
+          </a:p>
+          <a:p>
+            <a:pPr marL="1200150" lvl="2" indent="-285750">
+              <a:buFont typeface="Arial" panose="020B0604020202020204" pitchFamily="34" charset="0"/>
+              <a:buChar char="•"/>
+            </a:pPr>
+            <a:r>
+              <a:rPr lang="en-US" sz="1400" dirty="0">
+                <a:latin typeface="Arial" panose="020B0604020202020204" pitchFamily="34" charset="0"/>
+                <a:cs typeface="Arial" panose="020B0604020202020204" pitchFamily="34" charset="0"/>
+              </a:rPr>
+              <a:t>Positive: 0.573</a:t>
+            </a:r>
+          </a:p>
+          <a:p>
+            <a:pPr lvl="2"/>
+            <a:endParaRPr lang="en-US" sz="1400" dirty="0">
+              <a:latin typeface="Arial" panose="020B0604020202020204" pitchFamily="34" charset="0"/>
+              <a:cs typeface="Arial" panose="020B0604020202020204" pitchFamily="34" charset="0"/>
+            </a:endParaRPr>
+          </a:p>
+          <a:p>
+            <a:pPr>
+              <a:buNone/>
+            </a:pPr>
+            <a:r>
+              <a:rPr lang="en-US" sz="1400" b="1" dirty="0">
+                <a:latin typeface="Arial" panose="020B0604020202020204" pitchFamily="34" charset="0"/>
+                <a:cs typeface="Arial" panose="020B0604020202020204" pitchFamily="34" charset="0"/>
+              </a:rPr>
+              <a:t>2. </a:t>
+            </a:r>
+            <a:r>
+              <a:rPr lang="en-US" sz="1400" b="1" dirty="0" err="1">
+                <a:latin typeface="Arial" panose="020B0604020202020204" pitchFamily="34" charset="0"/>
+                <a:cs typeface="Arial" panose="020B0604020202020204" pitchFamily="34" charset="0"/>
+              </a:rPr>
+              <a:t>FinBERT</a:t>
+            </a:r>
+            <a:r>
+              <a:rPr lang="en-US" sz="1400" b="1" dirty="0">
+                <a:latin typeface="Arial" panose="020B0604020202020204" pitchFamily="34" charset="0"/>
+                <a:cs typeface="Arial" panose="020B0604020202020204" pitchFamily="34" charset="0"/>
+              </a:rPr>
+              <a:t> (Neural NLP)</a:t>
+            </a:r>
+            <a:endParaRPr lang="en-US" sz="1400" dirty="0">
+              <a:latin typeface="Arial" panose="020B0604020202020204" pitchFamily="34" charset="0"/>
+              <a:cs typeface="Arial" panose="020B0604020202020204" pitchFamily="34" charset="0"/>
+            </a:endParaRPr>
+          </a:p>
+          <a:p>
+            <a:pPr lvl="1">
+              <a:buFont typeface="Arial" panose="020B0604020202020204" pitchFamily="34" charset="0"/>
+              <a:buChar char="•"/>
+            </a:pPr>
+            <a:r>
+              <a:rPr lang="en-US" sz="1400" b="1" dirty="0">
+                <a:latin typeface="Arial" panose="020B0604020202020204" pitchFamily="34" charset="0"/>
+                <a:cs typeface="Arial" panose="020B0604020202020204" pitchFamily="34" charset="0"/>
+              </a:rPr>
+              <a:t>Predictions:</a:t>
+            </a:r>
+            <a:r>
+              <a:rPr lang="en-US" sz="1400" dirty="0">
+                <a:latin typeface="Arial" panose="020B0604020202020204" pitchFamily="34" charset="0"/>
+                <a:cs typeface="Arial" panose="020B0604020202020204" pitchFamily="34" charset="0"/>
+              </a:rPr>
+              <a:t> Applied on the same 50 test samples for comparison</a:t>
+            </a:r>
+          </a:p>
+          <a:p>
+            <a:pPr lvl="1">
+              <a:buFont typeface="Arial" panose="020B0604020202020204" pitchFamily="34" charset="0"/>
+              <a:buChar char="•"/>
+            </a:pPr>
+            <a:r>
+              <a:rPr lang="en-US" sz="1400" b="1" dirty="0">
+                <a:latin typeface="Arial" panose="020B0604020202020204" pitchFamily="34" charset="0"/>
+                <a:cs typeface="Arial" panose="020B0604020202020204" pitchFamily="34" charset="0"/>
+              </a:rPr>
+              <a:t>F1-Scores per Class:</a:t>
+            </a:r>
+            <a:endParaRPr lang="en-US" sz="1400" dirty="0">
+              <a:latin typeface="Arial" panose="020B0604020202020204" pitchFamily="34" charset="0"/>
+              <a:cs typeface="Arial" panose="020B0604020202020204" pitchFamily="34" charset="0"/>
+            </a:endParaRPr>
+          </a:p>
+          <a:p>
+            <a:pPr marL="1200150" lvl="2" indent="-285750">
+              <a:buFont typeface="Arial" panose="020B0604020202020204" pitchFamily="34" charset="0"/>
+              <a:buChar char="•"/>
+            </a:pPr>
+            <a:r>
+              <a:rPr lang="en-US" sz="1400" dirty="0">
+                <a:latin typeface="Arial" panose="020B0604020202020204" pitchFamily="34" charset="0"/>
+                <a:cs typeface="Arial" panose="020B0604020202020204" pitchFamily="34" charset="0"/>
+              </a:rPr>
+              <a:t>Negative: 0.560</a:t>
+            </a:r>
+          </a:p>
+          <a:p>
+            <a:pPr marL="1200150" lvl="2" indent="-285750">
+              <a:buFont typeface="Arial" panose="020B0604020202020204" pitchFamily="34" charset="0"/>
+              <a:buChar char="•"/>
+            </a:pPr>
+            <a:r>
+              <a:rPr lang="en-US" sz="1400" dirty="0">
+                <a:latin typeface="Arial" panose="020B0604020202020204" pitchFamily="34" charset="0"/>
+                <a:cs typeface="Arial" panose="020B0604020202020204" pitchFamily="34" charset="0"/>
+              </a:rPr>
+              <a:t>Neutral: 0.780</a:t>
+            </a:r>
+          </a:p>
+          <a:p>
+            <a:pPr marL="1200150" lvl="2" indent="-285750">
+              <a:buFont typeface="Arial" panose="020B0604020202020204" pitchFamily="34" charset="0"/>
+              <a:buChar char="•"/>
+            </a:pPr>
+            <a:r>
+              <a:rPr lang="en-US" sz="1400" dirty="0">
+                <a:latin typeface="Arial" panose="020B0604020202020204" pitchFamily="34" charset="0"/>
+                <a:cs typeface="Arial" panose="020B0604020202020204" pitchFamily="34" charset="0"/>
+              </a:rPr>
+              <a:t>Positive: 0.600</a:t>
+            </a:r>
+          </a:p>
+          <a:p>
+            <a:pPr lvl="2"/>
+            <a:endParaRPr lang="en-US" sz="1400" dirty="0">
+              <a:latin typeface="Arial" panose="020B0604020202020204" pitchFamily="34" charset="0"/>
+              <a:cs typeface="Arial" panose="020B0604020202020204" pitchFamily="34" charset="0"/>
+            </a:endParaRPr>
+          </a:p>
+          <a:p>
+            <a:pPr>
+              <a:buNone/>
+            </a:pPr>
+            <a:r>
+              <a:rPr lang="en-US" sz="1400" b="1" dirty="0">
+                <a:latin typeface="Arial" panose="020B0604020202020204" pitchFamily="34" charset="0"/>
+                <a:cs typeface="Arial" panose="020B0604020202020204" pitchFamily="34" charset="0"/>
+              </a:rPr>
+              <a:t>3. Visual Comparison</a:t>
+            </a:r>
+            <a:endParaRPr lang="en-US" sz="1400" dirty="0">
+              <a:latin typeface="Arial" panose="020B0604020202020204" pitchFamily="34" charset="0"/>
+              <a:cs typeface="Arial" panose="020B0604020202020204" pitchFamily="34" charset="0"/>
+            </a:endParaRPr>
+          </a:p>
+          <a:p>
+            <a:pPr lvl="1">
+              <a:buFont typeface="Arial" panose="020B0604020202020204" pitchFamily="34" charset="0"/>
+              <a:buChar char="•"/>
+            </a:pPr>
+            <a:r>
+              <a:rPr lang="en-US" sz="1400" b="1" dirty="0">
+                <a:latin typeface="Arial" panose="020B0604020202020204" pitchFamily="34" charset="0"/>
+                <a:cs typeface="Arial" panose="020B0604020202020204" pitchFamily="34" charset="0"/>
+              </a:rPr>
+              <a:t>Prediction Distribution:</a:t>
+            </a:r>
+            <a:r>
+              <a:rPr lang="en-US" sz="1400" dirty="0">
+                <a:latin typeface="Arial" panose="020B0604020202020204" pitchFamily="34" charset="0"/>
+                <a:cs typeface="Arial" panose="020B0604020202020204" pitchFamily="34" charset="0"/>
+              </a:rPr>
+              <a:t> Side-by-side bar chart for LR vs </a:t>
+            </a:r>
+            <a:r>
+              <a:rPr lang="en-US" sz="1400" dirty="0" err="1">
+                <a:latin typeface="Arial" panose="020B0604020202020204" pitchFamily="34" charset="0"/>
+                <a:cs typeface="Arial" panose="020B0604020202020204" pitchFamily="34" charset="0"/>
+              </a:rPr>
+              <a:t>FinBERT</a:t>
+            </a:r>
+            <a:endParaRPr lang="en-US" sz="1400" dirty="0">
+              <a:latin typeface="Arial" panose="020B0604020202020204" pitchFamily="34" charset="0"/>
+              <a:cs typeface="Arial" panose="020B0604020202020204" pitchFamily="34" charset="0"/>
+            </a:endParaRPr>
+          </a:p>
+          <a:p>
+            <a:pPr lvl="1">
+              <a:buFont typeface="Arial" panose="020B0604020202020204" pitchFamily="34" charset="0"/>
+              <a:buChar char="•"/>
+            </a:pPr>
+            <a:r>
+              <a:rPr lang="en-US" sz="1400" b="1" dirty="0">
+                <a:latin typeface="Arial" panose="020B0604020202020204" pitchFamily="34" charset="0"/>
+                <a:cs typeface="Arial" panose="020B0604020202020204" pitchFamily="34" charset="0"/>
+              </a:rPr>
+              <a:t>F1-score Comparison:</a:t>
+            </a:r>
+            <a:r>
+              <a:rPr lang="en-US" sz="1400" dirty="0">
+                <a:latin typeface="Arial" panose="020B0604020202020204" pitchFamily="34" charset="0"/>
+                <a:cs typeface="Arial" panose="020B0604020202020204" pitchFamily="34" charset="0"/>
+              </a:rPr>
+              <a:t> Class-wise bar chart highlights model strengths</a:t>
+            </a:r>
+          </a:p>
+          <a:p>
+            <a:pPr lvl="1"/>
+            <a:endParaRPr lang="en-US" sz="1400" dirty="0">
+              <a:latin typeface="Arial" panose="020B0604020202020204" pitchFamily="34" charset="0"/>
+              <a:cs typeface="Arial" panose="020B0604020202020204" pitchFamily="34" charset="0"/>
+            </a:endParaRPr>
+          </a:p>
+          <a:p>
+            <a:pPr>
+              <a:buNone/>
+            </a:pPr>
+            <a:r>
+              <a:rPr lang="en-US" sz="1400" b="1" dirty="0">
+                <a:latin typeface="Arial" panose="020B0604020202020204" pitchFamily="34" charset="0"/>
+                <a:cs typeface="Arial" panose="020B0604020202020204" pitchFamily="34" charset="0"/>
+              </a:rPr>
+              <a:t>4. Insights</a:t>
+            </a:r>
+            <a:endParaRPr lang="en-US" sz="1400" dirty="0">
+              <a:latin typeface="Arial" panose="020B0604020202020204" pitchFamily="34" charset="0"/>
+              <a:cs typeface="Arial" panose="020B0604020202020204" pitchFamily="34" charset="0"/>
+            </a:endParaRPr>
+          </a:p>
+          <a:p>
+            <a:pPr>
+              <a:buFont typeface="Arial" panose="020B0604020202020204" pitchFamily="34" charset="0"/>
+              <a:buChar char="•"/>
+            </a:pPr>
+            <a:r>
+              <a:rPr lang="en-US" sz="1400" dirty="0">
+                <a:latin typeface="Arial" panose="020B0604020202020204" pitchFamily="34" charset="0"/>
+                <a:cs typeface="Arial" panose="020B0604020202020204" pitchFamily="34" charset="0"/>
+              </a:rPr>
+              <a:t>LR performs better on Neutral class (balanced datasets benefit classical models)</a:t>
+            </a:r>
+          </a:p>
+          <a:p>
+            <a:pPr>
+              <a:buFont typeface="Arial" panose="020B0604020202020204" pitchFamily="34" charset="0"/>
+              <a:buChar char="•"/>
+            </a:pPr>
+            <a:r>
+              <a:rPr lang="en-US" sz="1400" dirty="0" err="1">
+                <a:latin typeface="Arial" panose="020B0604020202020204" pitchFamily="34" charset="0"/>
+                <a:cs typeface="Arial" panose="020B0604020202020204" pitchFamily="34" charset="0"/>
+              </a:rPr>
+              <a:t>FinBERT</a:t>
+            </a:r>
+            <a:r>
+              <a:rPr lang="en-US" sz="1400" dirty="0">
+                <a:latin typeface="Arial" panose="020B0604020202020204" pitchFamily="34" charset="0"/>
+                <a:cs typeface="Arial" panose="020B0604020202020204" pitchFamily="34" charset="0"/>
+              </a:rPr>
+              <a:t> captures some nuanced Positive and Negative sentiment better</a:t>
+            </a:r>
+          </a:p>
+          <a:p>
+            <a:pPr>
+              <a:buFont typeface="Arial" panose="020B0604020202020204" pitchFamily="34" charset="0"/>
+              <a:buChar char="•"/>
+            </a:pPr>
+            <a:r>
+              <a:rPr lang="en-US" sz="1400" dirty="0">
+                <a:latin typeface="Arial" panose="020B0604020202020204" pitchFamily="34" charset="0"/>
+                <a:cs typeface="Arial" panose="020B0604020202020204" pitchFamily="34" charset="0"/>
+              </a:rPr>
+              <a:t>Combining statistical and neural approaches can improve overall performance</a:t>
+            </a:r>
           </a:p>
         </p:txBody>
       </p:sp>
+      <p:pic>
+        <p:nvPicPr>
+          <p:cNvPr id="7" name="Picture 6">
+            <a:extLst>
+              <a:ext uri="{FF2B5EF4-FFF2-40B4-BE49-F238E27FC236}">
+                <a16:creationId xmlns:a16="http://schemas.microsoft.com/office/drawing/2014/main" id="{E0C6C235-C499-8C7B-CD7F-BBB3A487FE45}"/>
+              </a:ext>
+            </a:extLst>
+          </p:cNvPr>
+          <p:cNvPicPr>
+            <a:picLocks noChangeAspect="1"/>
+          </p:cNvPicPr>
+          <p:nvPr/>
+        </p:nvPicPr>
+        <p:blipFill>
+          <a:blip r:embed="rId2"/>
+          <a:stretch>
+            <a:fillRect/>
+          </a:stretch>
+        </p:blipFill>
+        <p:spPr>
+          <a:xfrm>
+            <a:off x="6764867" y="1202267"/>
+            <a:ext cx="4851400" cy="5461000"/>
+          </a:xfrm>
+          <a:prstGeom prst="rect">
+            <a:avLst/>
+          </a:prstGeom>
+        </p:spPr>
+      </p:pic>
     </p:spTree>
     <p:extLst>
       <p:ext uri="{BB962C8B-B14F-4D97-AF65-F5344CB8AC3E}">
@@ -2339,7 +3571,7 @@
           <a:lstStyle/>
           <a:p>
             <a:r>
-              <a:rPr lang="en-US"/>
+              <a:rPr lang="en-US" dirty="0"/>
               <a:t>Lessons learned and Perspectives </a:t>
             </a:r>
           </a:p>
@@ -2366,10 +3598,219 @@
           <a:bodyPr/>
           <a:lstStyle/>
           <a:p>
-            <a:endParaRPr lang="en-US"/>
+            <a:pPr marL="0" indent="0">
+              <a:buNone/>
+            </a:pPr>
+            <a:r>
+              <a:rPr lang="en-US" sz="1200" b="1" dirty="0">
+                <a:latin typeface="Arial" panose="020B0604020202020204" pitchFamily="34" charset="0"/>
+                <a:cs typeface="Arial" panose="020B0604020202020204" pitchFamily="34" charset="0"/>
+              </a:rPr>
+              <a:t>Lessons Learned :</a:t>
+            </a:r>
+          </a:p>
+          <a:p>
+            <a:r>
+              <a:rPr lang="en-US" sz="1200" dirty="0">
+                <a:latin typeface="Arial" panose="020B0604020202020204" pitchFamily="34" charset="0"/>
+                <a:cs typeface="Arial" panose="020B0604020202020204" pitchFamily="34" charset="0"/>
+              </a:rPr>
+              <a:t>Financial sentiment analysis is challenging due to domain-specific language, subtle cues, and class imbalance.</a:t>
+            </a:r>
+          </a:p>
+          <a:p>
+            <a:r>
+              <a:rPr lang="en-US" sz="1200" dirty="0">
+                <a:latin typeface="Arial" panose="020B0604020202020204" pitchFamily="34" charset="0"/>
+                <a:cs typeface="Arial" panose="020B0604020202020204" pitchFamily="34" charset="0"/>
+              </a:rPr>
+              <a:t>Classical statistical models (TF-IDF + Logistic Regression) provide solid baseline performance</a:t>
+            </a:r>
+          </a:p>
+          <a:p>
+            <a:pPr marL="0" indent="0">
+              <a:buNone/>
+            </a:pPr>
+            <a:r>
+              <a:rPr lang="en-US" sz="1200" dirty="0">
+                <a:latin typeface="Arial" panose="020B0604020202020204" pitchFamily="34" charset="0"/>
+                <a:cs typeface="Arial" panose="020B0604020202020204" pitchFamily="34" charset="0"/>
+              </a:rPr>
+              <a:t>      with reasonable accuracy (≈73%), but struggle with nuanced sentiment detection.</a:t>
+            </a:r>
+          </a:p>
+          <a:p>
+            <a:r>
+              <a:rPr lang="en-US" sz="1200" dirty="0">
+                <a:latin typeface="Arial" panose="020B0604020202020204" pitchFamily="34" charset="0"/>
+                <a:cs typeface="Arial" panose="020B0604020202020204" pitchFamily="34" charset="0"/>
+              </a:rPr>
+              <a:t>Neural transformer models like </a:t>
+            </a:r>
+            <a:r>
+              <a:rPr lang="en-US" sz="1200" dirty="0" err="1">
+                <a:latin typeface="Arial" panose="020B0604020202020204" pitchFamily="34" charset="0"/>
+                <a:cs typeface="Arial" panose="020B0604020202020204" pitchFamily="34" charset="0"/>
+              </a:rPr>
+              <a:t>FinBERT</a:t>
+            </a:r>
+            <a:r>
+              <a:rPr lang="en-US" sz="1200" dirty="0">
+                <a:latin typeface="Arial" panose="020B0604020202020204" pitchFamily="34" charset="0"/>
+                <a:cs typeface="Arial" panose="020B0604020202020204" pitchFamily="34" charset="0"/>
+              </a:rPr>
+              <a:t> better capture context and subtlety, but require more</a:t>
+            </a:r>
+          </a:p>
+          <a:p>
+            <a:pPr marL="0" indent="0">
+              <a:buNone/>
+            </a:pPr>
+            <a:r>
+              <a:rPr lang="en-US" sz="1200" dirty="0">
+                <a:latin typeface="Arial" panose="020B0604020202020204" pitchFamily="34" charset="0"/>
+                <a:cs typeface="Arial" panose="020B0604020202020204" pitchFamily="34" charset="0"/>
+              </a:rPr>
+              <a:t>       computation and careful sample selection for evaluation.</a:t>
+            </a:r>
+          </a:p>
+          <a:p>
+            <a:r>
+              <a:rPr lang="en-US" sz="1200" dirty="0">
+                <a:latin typeface="Arial" panose="020B0604020202020204" pitchFamily="34" charset="0"/>
+                <a:cs typeface="Arial" panose="020B0604020202020204" pitchFamily="34" charset="0"/>
+              </a:rPr>
+              <a:t>Exploratory data analysis (EDA), preprocessing, and proper handling of imbalanced </a:t>
+            </a:r>
+          </a:p>
+          <a:p>
+            <a:pPr marL="0" indent="0">
+              <a:buNone/>
+            </a:pPr>
+            <a:r>
+              <a:rPr lang="en-US" sz="1200" dirty="0">
+                <a:latin typeface="Arial" panose="020B0604020202020204" pitchFamily="34" charset="0"/>
+                <a:cs typeface="Arial" panose="020B0604020202020204" pitchFamily="34" charset="0"/>
+              </a:rPr>
+              <a:t>       classes (e.g., using SMOTE) significantly improve model performance and interpretability.</a:t>
+            </a:r>
+          </a:p>
+          <a:p>
+            <a:pPr marL="0" indent="0">
+              <a:buNone/>
+            </a:pPr>
+            <a:endParaRPr lang="en-US" sz="1200" dirty="0">
+              <a:latin typeface="Arial" panose="020B0604020202020204" pitchFamily="34" charset="0"/>
+              <a:cs typeface="Arial" panose="020B0604020202020204" pitchFamily="34" charset="0"/>
+            </a:endParaRPr>
+          </a:p>
+          <a:p>
+            <a:r>
+              <a:rPr lang="en-US" sz="1200" b="1" dirty="0">
+                <a:latin typeface="Arial" panose="020B0604020202020204" pitchFamily="34" charset="0"/>
+                <a:cs typeface="Arial" panose="020B0604020202020204" pitchFamily="34" charset="0"/>
+              </a:rPr>
+              <a:t>Perspectives / Future Work:</a:t>
+            </a:r>
+            <a:endParaRPr lang="en-US" sz="1200" dirty="0">
+              <a:latin typeface="Arial" panose="020B0604020202020204" pitchFamily="34" charset="0"/>
+              <a:cs typeface="Arial" panose="020B0604020202020204" pitchFamily="34" charset="0"/>
+            </a:endParaRPr>
+          </a:p>
+          <a:p>
+            <a:r>
+              <a:rPr lang="en-US" sz="1200" dirty="0">
+                <a:latin typeface="Arial" panose="020B0604020202020204" pitchFamily="34" charset="0"/>
+                <a:cs typeface="Arial" panose="020B0604020202020204" pitchFamily="34" charset="0"/>
+              </a:rPr>
+              <a:t>Expand the dataset to include more real-time financial news, social media posts, and earnings calls.</a:t>
+            </a:r>
+          </a:p>
+          <a:p>
+            <a:r>
+              <a:rPr lang="en-US" sz="1200" dirty="0">
+                <a:latin typeface="Arial" panose="020B0604020202020204" pitchFamily="34" charset="0"/>
+                <a:cs typeface="Arial" panose="020B0604020202020204" pitchFamily="34" charset="0"/>
+              </a:rPr>
+              <a:t>Fine-tune </a:t>
+            </a:r>
+            <a:r>
+              <a:rPr lang="en-US" sz="1200" dirty="0" err="1">
+                <a:latin typeface="Arial" panose="020B0604020202020204" pitchFamily="34" charset="0"/>
+                <a:cs typeface="Arial" panose="020B0604020202020204" pitchFamily="34" charset="0"/>
+              </a:rPr>
+              <a:t>FinBERT</a:t>
+            </a:r>
+            <a:r>
+              <a:rPr lang="en-US" sz="1200" dirty="0">
+                <a:latin typeface="Arial" panose="020B0604020202020204" pitchFamily="34" charset="0"/>
+                <a:cs typeface="Arial" panose="020B0604020202020204" pitchFamily="34" charset="0"/>
+              </a:rPr>
+              <a:t> or other domain-specific transformers for improved accuracy across all sentiment classes.</a:t>
+            </a:r>
+          </a:p>
+          <a:p>
+            <a:r>
+              <a:rPr lang="en-US" sz="1200" dirty="0">
+                <a:latin typeface="Arial" panose="020B0604020202020204" pitchFamily="34" charset="0"/>
+                <a:cs typeface="Arial" panose="020B0604020202020204" pitchFamily="34" charset="0"/>
+              </a:rPr>
+              <a:t>Explore multi-label sentiment detection to capture mixed sentiment within a single text.</a:t>
+            </a:r>
+          </a:p>
+          <a:p>
+            <a:r>
+              <a:rPr lang="en-US" sz="1200" dirty="0">
+                <a:latin typeface="Arial" panose="020B0604020202020204" pitchFamily="34" charset="0"/>
+                <a:cs typeface="Arial" panose="020B0604020202020204" pitchFamily="34" charset="0"/>
+              </a:rPr>
+              <a:t>Deploy models in a real-time monitoring system to provide actionable insights for investors.</a:t>
+            </a:r>
+          </a:p>
+          <a:p>
+            <a:r>
+              <a:rPr lang="en-US" sz="1200" dirty="0">
+                <a:latin typeface="Arial" panose="020B0604020202020204" pitchFamily="34" charset="0"/>
+                <a:cs typeface="Arial" panose="020B0604020202020204" pitchFamily="34" charset="0"/>
+              </a:rPr>
+              <a:t>Investigate hybrid approaches that combine statistical and neural methods for efficiency and robustness.</a:t>
+            </a:r>
+          </a:p>
+          <a:p>
+            <a:endParaRPr lang="en-US" dirty="0"/>
           </a:p>
         </p:txBody>
       </p:sp>
+      <p:pic>
+        <p:nvPicPr>
+          <p:cNvPr id="3" name="Picture 2">
+            <a:extLst>
+              <a:ext uri="{FF2B5EF4-FFF2-40B4-BE49-F238E27FC236}">
+                <a16:creationId xmlns:a16="http://schemas.microsoft.com/office/drawing/2014/main" id="{7B7A0749-D354-F335-2D45-5DE9195416BE}"/>
+              </a:ext>
+            </a:extLst>
+          </p:cNvPr>
+          <p:cNvPicPr>
+            <a:picLocks noChangeAspect="1"/>
+          </p:cNvPicPr>
+          <p:nvPr/>
+        </p:nvPicPr>
+        <p:blipFill>
+          <a:blip r:embed="rId2"/>
+          <a:stretch>
+            <a:fillRect/>
+          </a:stretch>
+        </p:blipFill>
+        <p:spPr>
+          <a:xfrm>
+            <a:off x="8779934" y="1648055"/>
+            <a:ext cx="2404534" cy="3818467"/>
+          </a:xfrm>
+          <a:prstGeom prst="rect">
+            <a:avLst/>
+          </a:prstGeom>
+        </p:spPr>
+      </p:pic>
     </p:spTree>
     <p:extLst>
       <p:ext uri="{BB962C8B-B14F-4D97-AF65-F5344CB8AC3E}">
@@ -2422,7 +3863,7 @@
           <a:lstStyle/>
           <a:p>
             <a:r>
-              <a:rPr lang="en-US"/>
+              <a:rPr lang="en-US" dirty="0"/>
               <a:t>Outcomes/finding</a:t>
             </a:r>
           </a:p>
@@ -2444,12 +3885,280 @@
             <p:ph sz="half" idx="1"/>
           </p:nvPr>
         </p:nvSpPr>
-        <p:spPr/>
+        <p:spPr>
+          <a:xfrm>
+            <a:off x="76199" y="1137478"/>
+            <a:ext cx="10515599" cy="4785485"/>
+          </a:xfrm>
+        </p:spPr>
         <p:txBody>
           <a:bodyPr/>
           <a:lstStyle/>
           <a:p>
-            <a:endParaRPr lang="en-US"/>
+            <a:pPr marL="0" indent="0">
+              <a:buNone/>
+            </a:pPr>
+            <a:r>
+              <a:rPr lang="en-US" sz="1000" b="1" dirty="0">
+                <a:latin typeface="Arial" panose="020B0604020202020204" pitchFamily="34" charset="0"/>
+                <a:cs typeface="Arial" panose="020B0604020202020204" pitchFamily="34" charset="0"/>
+              </a:rPr>
+              <a:t>Key Outcomes:</a:t>
+            </a:r>
+            <a:endParaRPr lang="en-US" sz="1000" dirty="0">
+              <a:latin typeface="Arial" panose="020B0604020202020204" pitchFamily="34" charset="0"/>
+              <a:cs typeface="Arial" panose="020B0604020202020204" pitchFamily="34" charset="0"/>
+            </a:endParaRPr>
+          </a:p>
+          <a:p>
+            <a:r>
+              <a:rPr lang="en-US" sz="1000" b="1" dirty="0">
+                <a:latin typeface="Arial" panose="020B0604020202020204" pitchFamily="34" charset="0"/>
+                <a:cs typeface="Arial" panose="020B0604020202020204" pitchFamily="34" charset="0"/>
+              </a:rPr>
+              <a:t>Dataset:</a:t>
+            </a:r>
+            <a:r>
+              <a:rPr lang="en-US" sz="1000" dirty="0">
+                <a:latin typeface="Arial" panose="020B0604020202020204" pitchFamily="34" charset="0"/>
+                <a:cs typeface="Arial" panose="020B0604020202020204" pitchFamily="34" charset="0"/>
+              </a:rPr>
+              <a:t> 4,845 financial text samples (news, reports, social media), with label distribution: Neutral (≈59%), Positive (≈28%), Negative (≈12%).</a:t>
+            </a:r>
+          </a:p>
+          <a:p>
+            <a:r>
+              <a:rPr lang="en-US" sz="1000" b="1" dirty="0">
+                <a:latin typeface="Arial" panose="020B0604020202020204" pitchFamily="34" charset="0"/>
+                <a:cs typeface="Arial" panose="020B0604020202020204" pitchFamily="34" charset="0"/>
+              </a:rPr>
+              <a:t>TF-IDF + Logistic Regression:</a:t>
+            </a:r>
+            <a:endParaRPr lang="en-US" sz="1000" dirty="0">
+              <a:latin typeface="Arial" panose="020B0604020202020204" pitchFamily="34" charset="0"/>
+              <a:cs typeface="Arial" panose="020B0604020202020204" pitchFamily="34" charset="0"/>
+            </a:endParaRPr>
+          </a:p>
+          <a:p>
+            <a:pPr lvl="1"/>
+            <a:r>
+              <a:rPr lang="en-US" sz="1000" dirty="0">
+                <a:latin typeface="Arial" panose="020B0604020202020204" pitchFamily="34" charset="0"/>
+                <a:cs typeface="Arial" panose="020B0604020202020204" pitchFamily="34" charset="0"/>
+              </a:rPr>
+              <a:t>Accuracy: </a:t>
+            </a:r>
+            <a:r>
+              <a:rPr lang="en-US" sz="1000" b="1" dirty="0">
+                <a:latin typeface="Arial" panose="020B0604020202020204" pitchFamily="34" charset="0"/>
+                <a:cs typeface="Arial" panose="020B0604020202020204" pitchFamily="34" charset="0"/>
+              </a:rPr>
+              <a:t>73%</a:t>
+            </a:r>
+            <a:endParaRPr lang="en-US" sz="1000" dirty="0">
+              <a:latin typeface="Arial" panose="020B0604020202020204" pitchFamily="34" charset="0"/>
+              <a:cs typeface="Arial" panose="020B0604020202020204" pitchFamily="34" charset="0"/>
+            </a:endParaRPr>
+          </a:p>
+          <a:p>
+            <a:pPr lvl="1"/>
+            <a:r>
+              <a:rPr lang="en-US" sz="1000" dirty="0">
+                <a:latin typeface="Arial" panose="020B0604020202020204" pitchFamily="34" charset="0"/>
+                <a:cs typeface="Arial" panose="020B0604020202020204" pitchFamily="34" charset="0"/>
+              </a:rPr>
+              <a:t>Macro F1-score: </a:t>
+            </a:r>
+            <a:r>
+              <a:rPr lang="en-US" sz="1000" b="1" dirty="0">
+                <a:latin typeface="Arial" panose="020B0604020202020204" pitchFamily="34" charset="0"/>
+                <a:cs typeface="Arial" panose="020B0604020202020204" pitchFamily="34" charset="0"/>
+              </a:rPr>
+              <a:t>≈0.667</a:t>
+            </a:r>
+            <a:endParaRPr lang="en-US" sz="1000" dirty="0">
+              <a:latin typeface="Arial" panose="020B0604020202020204" pitchFamily="34" charset="0"/>
+              <a:cs typeface="Arial" panose="020B0604020202020204" pitchFamily="34" charset="0"/>
+            </a:endParaRPr>
+          </a:p>
+          <a:p>
+            <a:pPr lvl="1"/>
+            <a:r>
+              <a:rPr lang="en-US" sz="1000" dirty="0">
+                <a:latin typeface="Arial" panose="020B0604020202020204" pitchFamily="34" charset="0"/>
+                <a:cs typeface="Arial" panose="020B0604020202020204" pitchFamily="34" charset="0"/>
+              </a:rPr>
+              <a:t>Strength: Good baseline performance for the majority class (Neutral)</a:t>
+            </a:r>
+          </a:p>
+          <a:p>
+            <a:pPr lvl="1"/>
+            <a:r>
+              <a:rPr lang="en-US" sz="1000" dirty="0">
+                <a:latin typeface="Arial" panose="020B0604020202020204" pitchFamily="34" charset="0"/>
+                <a:cs typeface="Arial" panose="020B0604020202020204" pitchFamily="34" charset="0"/>
+              </a:rPr>
+              <a:t>Weakness: Struggles with minority class (Negative)</a:t>
+            </a:r>
+          </a:p>
+          <a:p>
+            <a:r>
+              <a:rPr lang="en-US" sz="1000" b="1" dirty="0" err="1">
+                <a:latin typeface="Arial" panose="020B0604020202020204" pitchFamily="34" charset="0"/>
+                <a:cs typeface="Arial" panose="020B0604020202020204" pitchFamily="34" charset="0"/>
+              </a:rPr>
+              <a:t>FinBERT</a:t>
+            </a:r>
+            <a:r>
+              <a:rPr lang="en-US" sz="1000" b="1" dirty="0">
+                <a:latin typeface="Arial" panose="020B0604020202020204" pitchFamily="34" charset="0"/>
+                <a:cs typeface="Arial" panose="020B0604020202020204" pitchFamily="34" charset="0"/>
+              </a:rPr>
+              <a:t> (Neural Transformer):</a:t>
+            </a:r>
+            <a:endParaRPr lang="en-US" sz="1000" dirty="0">
+              <a:latin typeface="Arial" panose="020B0604020202020204" pitchFamily="34" charset="0"/>
+              <a:cs typeface="Arial" panose="020B0604020202020204" pitchFamily="34" charset="0"/>
+            </a:endParaRPr>
+          </a:p>
+          <a:p>
+            <a:pPr lvl="1"/>
+            <a:r>
+              <a:rPr lang="en-US" sz="1000" dirty="0">
+                <a:latin typeface="Arial" panose="020B0604020202020204" pitchFamily="34" charset="0"/>
+                <a:cs typeface="Arial" panose="020B0604020202020204" pitchFamily="34" charset="0"/>
+              </a:rPr>
+              <a:t>Better contextual understanding of financial texts</a:t>
+            </a:r>
+          </a:p>
+          <a:p>
+            <a:pPr lvl="1"/>
+            <a:r>
+              <a:rPr lang="en-US" sz="1000" dirty="0">
+                <a:latin typeface="Arial" panose="020B0604020202020204" pitchFamily="34" charset="0"/>
+                <a:cs typeface="Arial" panose="020B0604020202020204" pitchFamily="34" charset="0"/>
+              </a:rPr>
+              <a:t>Sample predictions show more nuanced sentiment capture than statistical methods</a:t>
+            </a:r>
+          </a:p>
+          <a:p>
+            <a:pPr lvl="1"/>
+            <a:r>
+              <a:rPr lang="en-US" sz="1000" dirty="0">
+                <a:latin typeface="Arial" panose="020B0604020202020204" pitchFamily="34" charset="0"/>
+                <a:cs typeface="Arial" panose="020B0604020202020204" pitchFamily="34" charset="0"/>
+              </a:rPr>
+              <a:t>Slightly higher F1 for minority classes in small test samples</a:t>
+            </a:r>
+          </a:p>
+          <a:p>
+            <a:pPr marL="0" indent="0">
+              <a:buNone/>
+            </a:pPr>
+            <a:r>
+              <a:rPr lang="en-US" sz="1000" b="1" dirty="0">
+                <a:latin typeface="Arial" panose="020B0604020202020204" pitchFamily="34" charset="0"/>
+                <a:cs typeface="Arial" panose="020B0604020202020204" pitchFamily="34" charset="0"/>
+              </a:rPr>
+              <a:t>Comparative Insights:</a:t>
+            </a:r>
+            <a:endParaRPr lang="en-US" sz="1000" dirty="0">
+              <a:latin typeface="Arial" panose="020B0604020202020204" pitchFamily="34" charset="0"/>
+              <a:cs typeface="Arial" panose="020B0604020202020204" pitchFamily="34" charset="0"/>
+            </a:endParaRPr>
+          </a:p>
+          <a:p>
+            <a:r>
+              <a:rPr lang="en-US" sz="1000" dirty="0">
+                <a:latin typeface="Arial" panose="020B0604020202020204" pitchFamily="34" charset="0"/>
+                <a:cs typeface="Arial" panose="020B0604020202020204" pitchFamily="34" charset="0"/>
+              </a:rPr>
+              <a:t>Side-by-side </a:t>
+            </a:r>
+            <a:r>
+              <a:rPr lang="en-US" sz="1000" b="1" dirty="0">
+                <a:latin typeface="Arial" panose="020B0604020202020204" pitchFamily="34" charset="0"/>
+                <a:cs typeface="Arial" panose="020B0604020202020204" pitchFamily="34" charset="0"/>
+              </a:rPr>
+              <a:t>prediction distribution comparison</a:t>
+            </a:r>
+            <a:r>
+              <a:rPr lang="en-US" sz="1000" dirty="0">
+                <a:latin typeface="Arial" panose="020B0604020202020204" pitchFamily="34" charset="0"/>
+                <a:cs typeface="Arial" panose="020B0604020202020204" pitchFamily="34" charset="0"/>
+              </a:rPr>
+              <a:t> shows TF-IDF + LR tends to over-predict Neutral, while </a:t>
+            </a:r>
+            <a:r>
+              <a:rPr lang="en-US" sz="1000" dirty="0" err="1">
+                <a:latin typeface="Arial" panose="020B0604020202020204" pitchFamily="34" charset="0"/>
+                <a:cs typeface="Arial" panose="020B0604020202020204" pitchFamily="34" charset="0"/>
+              </a:rPr>
+              <a:t>FinBERT</a:t>
+            </a:r>
+            <a:r>
+              <a:rPr lang="en-US" sz="1000" dirty="0">
+                <a:latin typeface="Arial" panose="020B0604020202020204" pitchFamily="34" charset="0"/>
+                <a:cs typeface="Arial" panose="020B0604020202020204" pitchFamily="34" charset="0"/>
+              </a:rPr>
+              <a:t> distributes predictions more evenly across classes.</a:t>
+            </a:r>
+          </a:p>
+          <a:p>
+            <a:r>
+              <a:rPr lang="en-US" sz="1000" b="1" dirty="0">
+                <a:latin typeface="Arial" panose="020B0604020202020204" pitchFamily="34" charset="0"/>
+                <a:cs typeface="Arial" panose="020B0604020202020204" pitchFamily="34" charset="0"/>
+              </a:rPr>
+              <a:t>F1-score comparison per class:</a:t>
+            </a:r>
+            <a:r>
+              <a:rPr lang="en-US" sz="1000" dirty="0">
+                <a:latin typeface="Arial" panose="020B0604020202020204" pitchFamily="34" charset="0"/>
+                <a:cs typeface="Arial" panose="020B0604020202020204" pitchFamily="34" charset="0"/>
+              </a:rPr>
+              <a:t> </a:t>
+            </a:r>
+            <a:r>
+              <a:rPr lang="en-US" sz="1000" dirty="0" err="1">
+                <a:latin typeface="Arial" panose="020B0604020202020204" pitchFamily="34" charset="0"/>
+                <a:cs typeface="Arial" panose="020B0604020202020204" pitchFamily="34" charset="0"/>
+              </a:rPr>
+              <a:t>FinBERT</a:t>
+            </a:r>
+            <a:r>
+              <a:rPr lang="en-US" sz="1000" dirty="0">
+                <a:latin typeface="Arial" panose="020B0604020202020204" pitchFamily="34" charset="0"/>
+                <a:cs typeface="Arial" panose="020B0604020202020204" pitchFamily="34" charset="0"/>
+              </a:rPr>
+              <a:t> captures Positive and Negative sentiments better than TF-IDF + LR on small samples.</a:t>
+            </a:r>
+          </a:p>
+          <a:p>
+            <a:r>
+              <a:rPr lang="en-US" sz="1000" dirty="0">
+                <a:latin typeface="Arial" panose="020B0604020202020204" pitchFamily="34" charset="0"/>
+                <a:cs typeface="Arial" panose="020B0604020202020204" pitchFamily="34" charset="0"/>
+              </a:rPr>
+              <a:t>Both methods are complementary: TF-IDF + LR is lightweight and interpretable, </a:t>
+            </a:r>
+            <a:r>
+              <a:rPr lang="en-US" sz="1000" dirty="0" err="1">
+                <a:latin typeface="Arial" panose="020B0604020202020204" pitchFamily="34" charset="0"/>
+                <a:cs typeface="Arial" panose="020B0604020202020204" pitchFamily="34" charset="0"/>
+              </a:rPr>
+              <a:t>FinBERT</a:t>
+            </a:r>
+            <a:r>
+              <a:rPr lang="en-US" sz="1000" dirty="0">
+                <a:latin typeface="Arial" panose="020B0604020202020204" pitchFamily="34" charset="0"/>
+                <a:cs typeface="Arial" panose="020B0604020202020204" pitchFamily="34" charset="0"/>
+              </a:rPr>
+              <a:t> is more context-aware but computationally heavier.</a:t>
+            </a:r>
+          </a:p>
+          <a:p>
+            <a:endParaRPr lang="en-US" dirty="0"/>
           </a:p>
         </p:txBody>
       </p:sp>
@@ -2508,31 +4217,6 @@
               <a:rPr lang="en-US"/>
               <a:t>Demo !</a:t>
             </a:r>
-          </a:p>
-        </p:txBody>
-      </p:sp>
-      <p:sp>
-        <p:nvSpPr>
-          <p:cNvPr id="3" name="Content Placeholder 2">
-            <a:extLst>
-              <a:ext uri="{FF2B5EF4-FFF2-40B4-BE49-F238E27FC236}">
-                <a16:creationId xmlns:a16="http://schemas.microsoft.com/office/drawing/2014/main" id="{DC17E1D0-C88F-D04E-A505-E4097285BC57}"/>
-              </a:ext>
-            </a:extLst>
-          </p:cNvPr>
-          <p:cNvSpPr>
-            <a:spLocks noGrp="1"/>
-          </p:cNvSpPr>
-          <p:nvPr>
-            <p:ph sz="half" idx="1"/>
-          </p:nvPr>
-        </p:nvSpPr>
-        <p:spPr/>
-        <p:txBody>
-          <a:bodyPr/>
-          <a:lstStyle/>
-          <a:p>
-            <a:endParaRPr lang="en-US"/>
           </a:p>
         </p:txBody>
       </p:sp>
@@ -3504,7 +5188,7 @@
           <a:lstStyle/>
           <a:p>
             <a:r>
-              <a:rPr lang="en-US"/>
+              <a:rPr lang="en-US" dirty="0"/>
               <a:t>Context and Introduction</a:t>
             </a:r>
           </a:p>
@@ -3529,7 +5213,7 @@
         <p:spPr>
           <a:xfrm>
             <a:off x="838200" y="1289878"/>
-            <a:ext cx="10515599" cy="4785485"/>
+            <a:ext cx="10744200" cy="4966989"/>
           </a:xfrm>
         </p:spPr>
         <p:txBody>
@@ -3537,35 +5221,35 @@
           <a:lstStyle/>
           <a:p>
             <a:r>
-              <a:rPr lang="en-US" sz="2000" b="1" dirty="0">
-                <a:latin typeface="Arial" panose="020B0604020202020204" pitchFamily="34" charset="0"/>
-                <a:cs typeface="Arial" panose="020B0604020202020204" pitchFamily="34" charset="0"/>
-              </a:rPr>
-              <a:t>Introduction:</a:t>
+              <a:rPr lang="en-US" sz="1600" b="1" dirty="0">
+                <a:latin typeface="Arial" panose="020B0604020202020204" pitchFamily="34" charset="0"/>
+                <a:cs typeface="Arial" panose="020B0604020202020204" pitchFamily="34" charset="0"/>
+              </a:rPr>
+              <a:t>Introduction </a:t>
             </a:r>
             <a:br>
-              <a:rPr lang="en-US" sz="2000" dirty="0">
+              <a:rPr lang="en-US" sz="1600" dirty="0">
                 <a:latin typeface="Arial" panose="020B0604020202020204" pitchFamily="34" charset="0"/>
                 <a:cs typeface="Arial" panose="020B0604020202020204" pitchFamily="34" charset="0"/>
               </a:rPr>
             </a:br>
             <a:r>
-              <a:rPr lang="en-US" sz="2000" dirty="0">
-                <a:latin typeface="Arial" panose="020B0604020202020204" pitchFamily="34" charset="0"/>
-                <a:cs typeface="Arial" panose="020B0604020202020204" pitchFamily="34" charset="0"/>
-              </a:rPr>
-              <a:t>Financial texts—news articles, social media posts, and earnings calls—reflect public perception and influence stock markets. With massive daily data, manual analysis is impossible. NLP automates sentiment extraction, providing actionable insights for investors. This project compares statistical and neural NLP methods to evaluate their effectiveness in capturing financial sentiment.</a:t>
-            </a:r>
-          </a:p>
-          <a:p>
-            <a:r>
-              <a:rPr lang="en-US" sz="1400" b="1" dirty="0">
+              <a:rPr lang="en-US" sz="1600" dirty="0">
+                <a:latin typeface="Arial" panose="020B0604020202020204" pitchFamily="34" charset="0"/>
+                <a:cs typeface="Arial" panose="020B0604020202020204" pitchFamily="34" charset="0"/>
+              </a:rPr>
+              <a:t>Financial texts, including news articles, social media posts, and earnings calls, play a critical role in shaping public perception and influencing stock market behavior. Due to the sheer volume of financial data generated daily, manual sentiment analysis is impractical. Natural Language Processing (NLP) provides a scalable solution by automatically extracting sentiment from these texts, offering actionable insights for investors. This project leverages both statistical and neural NLP methods to evaluate their effectiveness in capturing sentiment from diverse financial sources.</a:t>
+            </a:r>
+          </a:p>
+          <a:p>
+            <a:r>
+              <a:rPr lang="en-US" sz="1600" b="1" dirty="0">
                 <a:latin typeface="Arial" panose="020B0604020202020204" pitchFamily="34" charset="0"/>
                 <a:cs typeface="Arial" panose="020B0604020202020204" pitchFamily="34" charset="0"/>
               </a:rPr>
               <a:t>Key Points:</a:t>
             </a:r>
-            <a:endParaRPr lang="en-US" sz="1400" dirty="0">
+            <a:endParaRPr lang="en-US" sz="1600" dirty="0">
               <a:latin typeface="Arial" panose="020B0604020202020204" pitchFamily="34" charset="0"/>
               <a:cs typeface="Arial" panose="020B0604020202020204" pitchFamily="34" charset="0"/>
             </a:endParaRPr>
@@ -3573,7 +5257,7 @@
           <a:p>
             <a:pPr lvl="1"/>
             <a:r>
-              <a:rPr lang="en-US" sz="1400" dirty="0">
+              <a:rPr lang="en-US" sz="1200" dirty="0">
                 <a:latin typeface="Arial" panose="020B0604020202020204" pitchFamily="34" charset="0"/>
                 <a:cs typeface="Arial" panose="020B0604020202020204" pitchFamily="34" charset="0"/>
               </a:rPr>
@@ -3583,7 +5267,7 @@
           <a:p>
             <a:pPr lvl="1"/>
             <a:r>
-              <a:rPr lang="en-US" sz="1400" dirty="0">
+              <a:rPr lang="en-US" sz="1200" dirty="0">
                 <a:latin typeface="Arial" panose="020B0604020202020204" pitchFamily="34" charset="0"/>
                 <a:cs typeface="Arial" panose="020B0604020202020204" pitchFamily="34" charset="0"/>
               </a:rPr>
@@ -3593,7 +5277,7 @@
           <a:p>
             <a:pPr lvl="1"/>
             <a:r>
-              <a:rPr lang="en-US" sz="1400" dirty="0">
+              <a:rPr lang="en-US" sz="1200" dirty="0">
                 <a:latin typeface="Arial" panose="020B0604020202020204" pitchFamily="34" charset="0"/>
                 <a:cs typeface="Arial" panose="020B0604020202020204" pitchFamily="34" charset="0"/>
               </a:rPr>
@@ -3603,7 +5287,7 @@
           <a:p>
             <a:pPr lvl="1"/>
             <a:r>
-              <a:rPr lang="en-US" sz="1400" dirty="0">
+              <a:rPr lang="en-US" sz="1200" dirty="0">
                 <a:latin typeface="Arial" panose="020B0604020202020204" pitchFamily="34" charset="0"/>
                 <a:cs typeface="Arial" panose="020B0604020202020204" pitchFamily="34" charset="0"/>
               </a:rPr>
@@ -3611,13 +5295,26 @@
             </a:r>
           </a:p>
           <a:p>
+            <a:r>
+              <a:rPr lang="en-US" sz="1600" b="1" dirty="0">
+                <a:latin typeface="Arial" panose="020B0604020202020204" pitchFamily="34" charset="0"/>
+                <a:cs typeface="Arial" panose="020B0604020202020204" pitchFamily="34" charset="0"/>
+              </a:rPr>
+              <a:t>Project Goal:</a:t>
+            </a:r>
+            <a:endParaRPr lang="en-US" sz="1600" dirty="0">
+              <a:latin typeface="Arial" panose="020B0604020202020204" pitchFamily="34" charset="0"/>
+              <a:cs typeface="Arial" panose="020B0604020202020204" pitchFamily="34" charset="0"/>
+            </a:endParaRPr>
+          </a:p>
+          <a:p>
             <a:pPr lvl="1"/>
             <a:r>
-              <a:rPr lang="en-US" sz="1400" dirty="0">
-                <a:latin typeface="Arial" panose="020B0604020202020204" pitchFamily="34" charset="0"/>
-                <a:cs typeface="Arial" panose="020B0604020202020204" pitchFamily="34" charset="0"/>
-              </a:rPr>
-              <a:t>Goal: Compare statistical vs. neural NLP methods across diverse financial texts.</a:t>
+              <a:rPr lang="en-US" sz="1200" dirty="0">
+                <a:latin typeface="Arial" panose="020B0604020202020204" pitchFamily="34" charset="0"/>
+                <a:cs typeface="Arial" panose="020B0604020202020204" pitchFamily="34" charset="0"/>
+              </a:rPr>
+              <a:t>Compare statistical vs. neural NLP methods across diverse financial texts.</a:t>
             </a:r>
           </a:p>
           <a:p>
@@ -3663,8 +5360,8 @@
         </p:blipFill>
         <p:spPr>
           <a:xfrm>
-            <a:off x="1371599" y="4851400"/>
-            <a:ext cx="8534401" cy="1947333"/>
+            <a:off x="1320798" y="4715934"/>
+            <a:ext cx="8534401" cy="2006599"/>
           </a:xfrm>
           <a:prstGeom prst="rect">
             <a:avLst/>
@@ -3750,7 +5447,7 @@
         </p:nvSpPr>
         <p:spPr>
           <a:xfrm>
-            <a:off x="838200" y="1145945"/>
+            <a:off x="838200" y="1510012"/>
             <a:ext cx="10515599" cy="5254855"/>
           </a:xfrm>
         </p:spPr>
@@ -3758,70 +5455,97 @@
           <a:bodyPr lIns="91440" tIns="45720" rIns="91440" bIns="45720" anchor="t"/>
           <a:lstStyle/>
           <a:p>
-            <a:pPr algn="l">
-              <a:spcAft>
-                <a:spcPts val="1500"/>
-              </a:spcAft>
+            <a:r>
+              <a:rPr lang="en-US" sz="1800" b="1" dirty="0">
+                <a:latin typeface="Arial" panose="020B0604020202020204" pitchFamily="34" charset="0"/>
+                <a:cs typeface="Arial" panose="020B0604020202020204" pitchFamily="34" charset="0"/>
+              </a:rPr>
+              <a:t>Problem Statement:</a:t>
+            </a:r>
+            <a:br>
+              <a:rPr lang="en-US" sz="1800" dirty="0">
+                <a:latin typeface="Arial" panose="020B0604020202020204" pitchFamily="34" charset="0"/>
+                <a:cs typeface="Arial" panose="020B0604020202020204" pitchFamily="34" charset="0"/>
+              </a:rPr>
+            </a:br>
+            <a:r>
+              <a:rPr lang="en-US" sz="1800" dirty="0">
+                <a:latin typeface="Arial" panose="020B0604020202020204" pitchFamily="34" charset="0"/>
+                <a:cs typeface="Arial" panose="020B0604020202020204" pitchFamily="34" charset="0"/>
+              </a:rPr>
+              <a:t>While financial text data is abundant—from news articles to social media posts and earnings calls—extracting reliable sentiment remains challenging. Financial language is highly domain-specific, often subtle, and context-dependent, making it difficult for traditional NLP models to accurately capture sentiment. Classical statistical methods like TF-IDF and n-grams provide baseline insights but fail to understand nuanced meaning, while advanced neural and transformer models aim to bridge this gap.</a:t>
+            </a:r>
+          </a:p>
+          <a:p>
+            <a:pPr marL="0" indent="0">
               <a:buNone/>
             </a:pPr>
-            <a:endParaRPr lang="en-US" sz="1800" b="1" i="0" dirty="0">
-              <a:solidFill>
-                <a:srgbClr val="000000"/>
-              </a:solidFill>
-              <a:effectLst/>
+            <a:endParaRPr lang="en-US" sz="1800" dirty="0">
               <a:latin typeface="Arial" panose="020B0604020202020204" pitchFamily="34" charset="0"/>
               <a:cs typeface="Arial" panose="020B0604020202020204" pitchFamily="34" charset="0"/>
             </a:endParaRPr>
           </a:p>
           <a:p>
             <a:r>
-              <a:rPr lang="en-US" sz="2000" b="1" dirty="0">
-                <a:latin typeface="Arial" panose="020B0604020202020204" pitchFamily="34" charset="0"/>
-                <a:cs typeface="Arial" panose="020B0604020202020204" pitchFamily="34" charset="0"/>
-              </a:rPr>
-              <a:t>Problem :</a:t>
-            </a:r>
-          </a:p>
-          <a:p>
-            <a:pPr marL="457200" lvl="1" indent="0">
-              <a:buNone/>
-            </a:pPr>
-            <a:r>
-              <a:rPr lang="en-US" sz="1600" dirty="0">
-                <a:latin typeface="Arial" panose="020B0604020202020204" pitchFamily="34" charset="0"/>
-                <a:cs typeface="Arial" panose="020B0604020202020204" pitchFamily="34" charset="0"/>
-              </a:rPr>
-              <a:t>While financial text data is abundant—from news articles to social media posts and earnings calls—extracting reliable sentiment remains challenging. Financial language is highly domain-specific, often subtle, and context-dependent, making it difficult for traditional NLP models to accurately capture sentiment. Classical statistical methods like TF-IDF and n-grams provide baseline insights but fail to understand nuanced meaning, while advanced neural and transformer models aim to bridge this gap.</a:t>
-            </a:r>
-          </a:p>
-          <a:p>
-            <a:pPr marL="457200" lvl="1" indent="0">
-              <a:buNone/>
-            </a:pPr>
-            <a:endParaRPr lang="en-US" sz="1600" dirty="0">
+              <a:rPr lang="en-US" sz="1800" b="1" dirty="0">
+                <a:latin typeface="Arial" panose="020B0604020202020204" pitchFamily="34" charset="0"/>
+                <a:cs typeface="Arial" panose="020B0604020202020204" pitchFamily="34" charset="0"/>
+              </a:rPr>
+              <a:t>Challenges:</a:t>
+            </a:r>
+            <a:endParaRPr lang="en-US" sz="1800" dirty="0">
               <a:latin typeface="Arial" panose="020B0604020202020204" pitchFamily="34" charset="0"/>
               <a:cs typeface="Arial" panose="020B0604020202020204" pitchFamily="34" charset="0"/>
             </a:endParaRPr>
           </a:p>
           <a:p>
-            <a:r>
-              <a:rPr lang="en-US" sz="2000" b="1" dirty="0">
-                <a:latin typeface="Arial" panose="020B0604020202020204" pitchFamily="34" charset="0"/>
-                <a:cs typeface="Arial" panose="020B0604020202020204" pitchFamily="34" charset="0"/>
-              </a:rPr>
-              <a:t>Challenges:</a:t>
-            </a:r>
-          </a:p>
-          <a:p>
-            <a:pPr marL="457200" lvl="1" indent="0">
-              <a:buNone/>
-            </a:pPr>
-            <a:r>
-              <a:rPr lang="en-US" sz="1600" dirty="0">
-                <a:latin typeface="Arial" panose="020B0604020202020204" pitchFamily="34" charset="0"/>
-                <a:cs typeface="Arial" panose="020B0604020202020204" pitchFamily="34" charset="0"/>
-              </a:rPr>
-              <a:t>Financial sentiment analysis faces several unique challenges. Human language includes slang, sarcasm, and idioms, which can mislead models. Financial texts also contain domain-specific jargon, and datasets are often imbalanced across sentiment categories. Additionally, neural models risk overfitting, and deep learning approaches require significant computational resources, which can be a limitation without GPUs. Accurately modeling sentiment depth beyond simple positive, neutral, or negative labels is also a persistent difficulty.</a:t>
+            <a:pPr lvl="1"/>
+            <a:r>
+              <a:rPr lang="en-US" sz="1400" dirty="0">
+                <a:latin typeface="Arial" panose="020B0604020202020204" pitchFamily="34" charset="0"/>
+                <a:cs typeface="Arial" panose="020B0604020202020204" pitchFamily="34" charset="0"/>
+              </a:rPr>
+              <a:t>Human language includes slang, sarcasm, and idioms, which can mislead models.</a:t>
+            </a:r>
+          </a:p>
+          <a:p>
+            <a:pPr lvl="1"/>
+            <a:r>
+              <a:rPr lang="en-US" sz="1400" dirty="0">
+                <a:latin typeface="Arial" panose="020B0604020202020204" pitchFamily="34" charset="0"/>
+                <a:cs typeface="Arial" panose="020B0604020202020204" pitchFamily="34" charset="0"/>
+              </a:rPr>
+              <a:t>Financial texts contain domain-specific jargon that is difficult to interpret.</a:t>
+            </a:r>
+          </a:p>
+          <a:p>
+            <a:pPr lvl="1"/>
+            <a:r>
+              <a:rPr lang="en-US" sz="1400" dirty="0">
+                <a:latin typeface="Arial" panose="020B0604020202020204" pitchFamily="34" charset="0"/>
+                <a:cs typeface="Arial" panose="020B0604020202020204" pitchFamily="34" charset="0"/>
+              </a:rPr>
+              <a:t>Datasets are often imbalanced across sentiment categories.</a:t>
+            </a:r>
+          </a:p>
+          <a:p>
+            <a:pPr lvl="1"/>
+            <a:r>
+              <a:rPr lang="en-US" sz="1400" dirty="0">
+                <a:latin typeface="Arial" panose="020B0604020202020204" pitchFamily="34" charset="0"/>
+                <a:cs typeface="Arial" panose="020B0604020202020204" pitchFamily="34" charset="0"/>
+              </a:rPr>
+              <a:t>Neural models risk overfitting and require significant computational resources.</a:t>
+            </a:r>
+          </a:p>
+          <a:p>
+            <a:pPr lvl="1"/>
+            <a:r>
+              <a:rPr lang="en-US" sz="1400" dirty="0">
+                <a:latin typeface="Arial" panose="020B0604020202020204" pitchFamily="34" charset="0"/>
+                <a:cs typeface="Arial" panose="020B0604020202020204" pitchFamily="34" charset="0"/>
+              </a:rPr>
+              <a:t>Capturing sentiment depth beyond simple positive, neutral, or negative labels is complex.</a:t>
             </a:r>
           </a:p>
           <a:p>
@@ -7592,7 +9316,7 @@
           <a:lstStyle/>
           <a:p>
             <a:r>
-              <a:rPr lang="en-US"/>
+              <a:rPr lang="en-US" dirty="0"/>
               <a:t>Data Collecting</a:t>
             </a:r>
           </a:p>
@@ -7614,15 +9338,254 @@
             <p:ph sz="half" idx="1"/>
           </p:nvPr>
         </p:nvSpPr>
-        <p:spPr/>
+        <p:spPr>
+          <a:xfrm>
+            <a:off x="270933" y="1389092"/>
+            <a:ext cx="8212668" cy="4785485"/>
+          </a:xfrm>
+        </p:spPr>
         <p:txBody>
           <a:bodyPr/>
           <a:lstStyle/>
           <a:p>
-            <a:endParaRPr lang="en-US"/>
+            <a:r>
+              <a:rPr lang="en-US" sz="1200" b="1" dirty="0">
+                <a:latin typeface="Arial" panose="020B0604020202020204" pitchFamily="34" charset="0"/>
+                <a:cs typeface="Arial" panose="020B0604020202020204" pitchFamily="34" charset="0"/>
+              </a:rPr>
+              <a:t>Dataset Overview:</a:t>
+            </a:r>
+            <a:endParaRPr lang="en-US" sz="1200" dirty="0">
+              <a:latin typeface="Arial" panose="020B0604020202020204" pitchFamily="34" charset="0"/>
+              <a:cs typeface="Arial" panose="020B0604020202020204" pitchFamily="34" charset="0"/>
+            </a:endParaRPr>
+          </a:p>
+          <a:p>
+            <a:pPr lvl="1"/>
+            <a:r>
+              <a:rPr lang="en-US" sz="1200" dirty="0">
+                <a:latin typeface="Arial" panose="020B0604020202020204" pitchFamily="34" charset="0"/>
+                <a:cs typeface="Arial" panose="020B0604020202020204" pitchFamily="34" charset="0"/>
+              </a:rPr>
+              <a:t>Source: Collected financial texts including news articles, social media posts, and corporate reports.</a:t>
+            </a:r>
+          </a:p>
+          <a:p>
+            <a:pPr lvl="1"/>
+            <a:r>
+              <a:rPr lang="en-US" sz="1200" dirty="0">
+                <a:latin typeface="Arial" panose="020B0604020202020204" pitchFamily="34" charset="0"/>
+                <a:cs typeface="Arial" panose="020B0604020202020204" pitchFamily="34" charset="0"/>
+              </a:rPr>
+              <a:t>Total Samples: </a:t>
+            </a:r>
+            <a:r>
+              <a:rPr lang="en-US" sz="1200" b="1" dirty="0">
+                <a:latin typeface="Arial" panose="020B0604020202020204" pitchFamily="34" charset="0"/>
+                <a:cs typeface="Arial" panose="020B0604020202020204" pitchFamily="34" charset="0"/>
+              </a:rPr>
+              <a:t>4,845 entries</a:t>
+            </a:r>
+            <a:endParaRPr lang="en-US" sz="1200" dirty="0">
+              <a:latin typeface="Arial" panose="020B0604020202020204" pitchFamily="34" charset="0"/>
+              <a:cs typeface="Arial" panose="020B0604020202020204" pitchFamily="34" charset="0"/>
+            </a:endParaRPr>
+          </a:p>
+          <a:p>
+            <a:pPr lvl="1"/>
+            <a:r>
+              <a:rPr lang="en-US" sz="1200" dirty="0">
+                <a:latin typeface="Arial" panose="020B0604020202020204" pitchFamily="34" charset="0"/>
+                <a:cs typeface="Arial" panose="020B0604020202020204" pitchFamily="34" charset="0"/>
+              </a:rPr>
+              <a:t>Columns:</a:t>
+            </a:r>
+          </a:p>
+          <a:p>
+            <a:pPr lvl="2"/>
+            <a:r>
+              <a:rPr lang="en-US" sz="1200" dirty="0">
+                <a:latin typeface="Arial" panose="020B0604020202020204" pitchFamily="34" charset="0"/>
+                <a:cs typeface="Arial" panose="020B0604020202020204" pitchFamily="34" charset="0"/>
+              </a:rPr>
+              <a:t>Sentiment labels ( positive, neutral, negative)</a:t>
+            </a:r>
+          </a:p>
+          <a:p>
+            <a:pPr lvl="2"/>
+            <a:r>
+              <a:rPr lang="en-US" sz="1200" dirty="0">
+                <a:latin typeface="Arial" panose="020B0604020202020204" pitchFamily="34" charset="0"/>
+                <a:cs typeface="Arial" panose="020B0604020202020204" pitchFamily="34" charset="0"/>
+              </a:rPr>
+              <a:t>Raw financial text content</a:t>
+            </a:r>
+          </a:p>
+          <a:p>
+            <a:r>
+              <a:rPr lang="en-US" sz="1200" b="1" dirty="0">
+                <a:latin typeface="Arial" panose="020B0604020202020204" pitchFamily="34" charset="0"/>
+                <a:cs typeface="Arial" panose="020B0604020202020204" pitchFamily="34" charset="0"/>
+              </a:rPr>
+              <a:t>Label Distribution:</a:t>
+            </a:r>
+            <a:endParaRPr lang="en-US" sz="1200" dirty="0">
+              <a:latin typeface="Arial" panose="020B0604020202020204" pitchFamily="34" charset="0"/>
+              <a:cs typeface="Arial" panose="020B0604020202020204" pitchFamily="34" charset="0"/>
+            </a:endParaRPr>
+          </a:p>
+          <a:p>
+            <a:pPr lvl="1"/>
+            <a:r>
+              <a:rPr lang="en-US" sz="1200" dirty="0">
+                <a:latin typeface="Arial" panose="020B0604020202020204" pitchFamily="34" charset="0"/>
+                <a:cs typeface="Arial" panose="020B0604020202020204" pitchFamily="34" charset="0"/>
+              </a:rPr>
+              <a:t>Neutral: 2,878 samples</a:t>
+            </a:r>
+          </a:p>
+          <a:p>
+            <a:pPr lvl="1"/>
+            <a:r>
+              <a:rPr lang="en-US" sz="1200" dirty="0">
+                <a:latin typeface="Arial" panose="020B0604020202020204" pitchFamily="34" charset="0"/>
+                <a:cs typeface="Arial" panose="020B0604020202020204" pitchFamily="34" charset="0"/>
+              </a:rPr>
+              <a:t>Positive: 1,363 samples</a:t>
+            </a:r>
+          </a:p>
+          <a:p>
+            <a:pPr lvl="1"/>
+            <a:r>
+              <a:rPr lang="en-US" sz="1200" dirty="0">
+                <a:latin typeface="Arial" panose="020B0604020202020204" pitchFamily="34" charset="0"/>
+                <a:cs typeface="Arial" panose="020B0604020202020204" pitchFamily="34" charset="0"/>
+              </a:rPr>
+              <a:t>Negative: 604 samples</a:t>
+            </a:r>
+          </a:p>
+          <a:p>
+            <a:r>
+              <a:rPr lang="en-US" sz="1200" b="1" dirty="0">
+                <a:latin typeface="Arial" panose="020B0604020202020204" pitchFamily="34" charset="0"/>
+                <a:cs typeface="Arial" panose="020B0604020202020204" pitchFamily="34" charset="0"/>
+              </a:rPr>
+              <a:t>Observations:</a:t>
+            </a:r>
+            <a:endParaRPr lang="en-US" sz="1200" dirty="0">
+              <a:latin typeface="Arial" panose="020B0604020202020204" pitchFamily="34" charset="0"/>
+              <a:cs typeface="Arial" panose="020B0604020202020204" pitchFamily="34" charset="0"/>
+            </a:endParaRPr>
+          </a:p>
+          <a:p>
+            <a:pPr lvl="1"/>
+            <a:r>
+              <a:rPr lang="en-US" sz="1200" dirty="0">
+                <a:latin typeface="Arial" panose="020B0604020202020204" pitchFamily="34" charset="0"/>
+                <a:cs typeface="Arial" panose="020B0604020202020204" pitchFamily="34" charset="0"/>
+              </a:rPr>
+              <a:t>The dataset is </a:t>
+            </a:r>
+            <a:r>
+              <a:rPr lang="en-US" sz="1200" b="1" dirty="0">
+                <a:latin typeface="Arial" panose="020B0604020202020204" pitchFamily="34" charset="0"/>
+                <a:cs typeface="Arial" panose="020B0604020202020204" pitchFamily="34" charset="0"/>
+              </a:rPr>
+              <a:t>imbalanced</a:t>
+            </a:r>
+            <a:r>
+              <a:rPr lang="en-US" sz="1200" dirty="0">
+                <a:latin typeface="Arial" panose="020B0604020202020204" pitchFamily="34" charset="0"/>
+                <a:cs typeface="Arial" panose="020B0604020202020204" pitchFamily="34" charset="0"/>
+              </a:rPr>
+              <a:t>, with neutral texts dominating.</a:t>
+            </a:r>
+          </a:p>
+          <a:p>
+            <a:pPr lvl="1"/>
+            <a:r>
+              <a:rPr lang="en-US" sz="1200" dirty="0">
+                <a:latin typeface="Arial" panose="020B0604020202020204" pitchFamily="34" charset="0"/>
+                <a:cs typeface="Arial" panose="020B0604020202020204" pitchFamily="34" charset="0"/>
+              </a:rPr>
+              <a:t>Texts vary significantly in length, reflecting diverse sources (short social media posts vs. long news articles).</a:t>
+            </a:r>
+          </a:p>
+          <a:p>
+            <a:pPr lvl="1"/>
+            <a:r>
+              <a:rPr lang="en-US" sz="1200" dirty="0">
+                <a:latin typeface="Arial" panose="020B0604020202020204" pitchFamily="34" charset="0"/>
+                <a:cs typeface="Arial" panose="020B0604020202020204" pitchFamily="34" charset="0"/>
+              </a:rPr>
+              <a:t>Preprocessing was necessary to clean URLs, emails, memorable characters, and normalize text.</a:t>
+            </a:r>
+          </a:p>
+          <a:p>
+            <a:endParaRPr lang="en-US" dirty="0"/>
           </a:p>
         </p:txBody>
       </p:sp>
+      <p:pic>
+        <p:nvPicPr>
+          <p:cNvPr id="7" name="Picture 6">
+            <a:extLst>
+              <a:ext uri="{FF2B5EF4-FFF2-40B4-BE49-F238E27FC236}">
+                <a16:creationId xmlns:a16="http://schemas.microsoft.com/office/drawing/2014/main" id="{5ACB003A-B4D3-C90F-C800-0839888246F7}"/>
+              </a:ext>
+            </a:extLst>
+          </p:cNvPr>
+          <p:cNvPicPr>
+            <a:picLocks noChangeAspect="1"/>
+          </p:cNvPicPr>
+          <p:nvPr/>
+        </p:nvPicPr>
+        <p:blipFill>
+          <a:blip r:embed="rId2"/>
+          <a:stretch>
+            <a:fillRect/>
+          </a:stretch>
+        </p:blipFill>
+        <p:spPr>
+          <a:xfrm>
+            <a:off x="8359666" y="218200"/>
+            <a:ext cx="3685336" cy="1379008"/>
+          </a:xfrm>
+          <a:prstGeom prst="rect">
+            <a:avLst/>
+          </a:prstGeom>
+        </p:spPr>
+      </p:pic>
+      <p:pic>
+        <p:nvPicPr>
+          <p:cNvPr id="9" name="Picture 8">
+            <a:extLst>
+              <a:ext uri="{FF2B5EF4-FFF2-40B4-BE49-F238E27FC236}">
+                <a16:creationId xmlns:a16="http://schemas.microsoft.com/office/drawing/2014/main" id="{BE48D0BD-5AE5-C44A-F9EA-BE0F1E845759}"/>
+              </a:ext>
+            </a:extLst>
+          </p:cNvPr>
+          <p:cNvPicPr>
+            <a:picLocks noChangeAspect="1"/>
+          </p:cNvPicPr>
+          <p:nvPr/>
+        </p:nvPicPr>
+        <p:blipFill>
+          <a:blip r:embed="rId3"/>
+          <a:stretch>
+            <a:fillRect/>
+          </a:stretch>
+        </p:blipFill>
+        <p:spPr>
+          <a:xfrm>
+            <a:off x="8337331" y="1607907"/>
+            <a:ext cx="3583736" cy="4783099"/>
+          </a:xfrm>
+          <a:prstGeom prst="rect">
+            <a:avLst/>
+          </a:prstGeom>
+        </p:spPr>
+      </p:pic>
     </p:spTree>
     <p:extLst>
       <p:ext uri="{BB962C8B-B14F-4D97-AF65-F5344CB8AC3E}">
@@ -7675,7 +9638,7 @@
           <a:lstStyle/>
           <a:p>
             <a:r>
-              <a:rPr lang="en-US"/>
+              <a:rPr lang="en-US" dirty="0"/>
               <a:t>Data Preprocessing</a:t>
             </a:r>
           </a:p>
@@ -7697,15 +9660,112 @@
             <p:ph sz="half" idx="1"/>
           </p:nvPr>
         </p:nvSpPr>
-        <p:spPr/>
+        <p:spPr>
+          <a:xfrm>
+            <a:off x="660399" y="1281411"/>
+            <a:ext cx="10515599" cy="4785485"/>
+          </a:xfrm>
+        </p:spPr>
         <p:txBody>
           <a:bodyPr/>
           <a:lstStyle/>
           <a:p>
+            <a:r>
+              <a:rPr lang="en-US" sz="1400" dirty="0">
+                <a:latin typeface="Arial" panose="020B0604020202020204" pitchFamily="34" charset="0"/>
+                <a:cs typeface="Arial" panose="020B0604020202020204" pitchFamily="34" charset="0"/>
+              </a:rPr>
+              <a:t>Before training NLP models, raw financial texts were cleaned and standardized. This step ensures that the models can learn meaningful patterns without being affected by noise like URLs, punctuation, or inconsistent capitalization. Sentiment labels were mapped to numeric values for classification tasks.</a:t>
+            </a:r>
+          </a:p>
+          <a:p>
+            <a:r>
+              <a:rPr lang="en-US" sz="1400" b="1" dirty="0">
+                <a:latin typeface="Arial" panose="020B0604020202020204" pitchFamily="34" charset="0"/>
+                <a:cs typeface="Arial" panose="020B0604020202020204" pitchFamily="34" charset="0"/>
+              </a:rPr>
+              <a:t>Key Steps:</a:t>
+            </a:r>
+            <a:endParaRPr lang="en-US" sz="1400" dirty="0">
+              <a:latin typeface="Arial" panose="020B0604020202020204" pitchFamily="34" charset="0"/>
+              <a:cs typeface="Arial" panose="020B0604020202020204" pitchFamily="34" charset="0"/>
+            </a:endParaRPr>
+          </a:p>
+          <a:p>
+            <a:pPr lvl="1"/>
+            <a:r>
+              <a:rPr lang="en-US" sz="1000" dirty="0">
+                <a:latin typeface="Arial" panose="020B0604020202020204" pitchFamily="34" charset="0"/>
+                <a:cs typeface="Arial" panose="020B0604020202020204" pitchFamily="34" charset="0"/>
+              </a:rPr>
+              <a:t>Convert text to lowercase</a:t>
+            </a:r>
+          </a:p>
+          <a:p>
+            <a:pPr lvl="1"/>
+            <a:r>
+              <a:rPr lang="en-US" sz="1000" dirty="0">
+                <a:latin typeface="Arial" panose="020B0604020202020204" pitchFamily="34" charset="0"/>
+                <a:cs typeface="Arial" panose="020B0604020202020204" pitchFamily="34" charset="0"/>
+              </a:rPr>
+              <a:t>Remove URLs, emails, special characters</a:t>
+            </a:r>
+          </a:p>
+          <a:p>
+            <a:pPr lvl="1"/>
+            <a:r>
+              <a:rPr lang="en-US" sz="1000" dirty="0">
+                <a:latin typeface="Arial" panose="020B0604020202020204" pitchFamily="34" charset="0"/>
+                <a:cs typeface="Arial" panose="020B0604020202020204" pitchFamily="34" charset="0"/>
+              </a:rPr>
+              <a:t>Remove extra whitespace</a:t>
+            </a:r>
+          </a:p>
+          <a:p>
+            <a:pPr lvl="1"/>
+            <a:r>
+              <a:rPr lang="en-US" sz="1000" dirty="0">
+                <a:latin typeface="Arial" panose="020B0604020202020204" pitchFamily="34" charset="0"/>
+                <a:cs typeface="Arial" panose="020B0604020202020204" pitchFamily="34" charset="0"/>
+              </a:rPr>
+              <a:t>Map sentiment labels to numeric codes (0=Negative, 1=Neutral, 2=Positive)</a:t>
+            </a:r>
+          </a:p>
+          <a:p>
             <a:endParaRPr lang="en-US" dirty="0"/>
           </a:p>
         </p:txBody>
       </p:sp>
+      <p:pic>
+        <p:nvPicPr>
+          <p:cNvPr id="5" name="Picture 4">
+            <a:extLst>
+              <a:ext uri="{FF2B5EF4-FFF2-40B4-BE49-F238E27FC236}">
+                <a16:creationId xmlns:a16="http://schemas.microsoft.com/office/drawing/2014/main" id="{94013AAC-85AA-DFE3-E447-ECAC5DBEE63B}"/>
+              </a:ext>
+            </a:extLst>
+          </p:cNvPr>
+          <p:cNvPicPr>
+            <a:picLocks noChangeAspect="1"/>
+          </p:cNvPicPr>
+          <p:nvPr/>
+        </p:nvPicPr>
+        <p:blipFill>
+          <a:blip r:embed="rId2"/>
+          <a:stretch>
+            <a:fillRect/>
+          </a:stretch>
+        </p:blipFill>
+        <p:spPr>
+          <a:xfrm>
+            <a:off x="6096000" y="2032000"/>
+            <a:ext cx="4427604" cy="4690533"/>
+          </a:xfrm>
+          <a:prstGeom prst="rect">
+            <a:avLst/>
+          </a:prstGeom>
+        </p:spPr>
+      </p:pic>
     </p:spTree>
     <p:extLst>
       <p:ext uri="{BB962C8B-B14F-4D97-AF65-F5344CB8AC3E}">
@@ -7758,7 +9818,7 @@
           <a:lstStyle/>
           <a:p>
             <a:r>
-              <a:rPr lang="en-US"/>
+              <a:rPr lang="en-US" dirty="0"/>
               <a:t>Methodology </a:t>
             </a:r>
           </a:p>
@@ -7766,10 +9826,10 @@
       </p:sp>
       <p:sp>
         <p:nvSpPr>
-          <p:cNvPr id="3" name="Content Placeholder 2">
+          <p:cNvPr id="5" name="Content Placeholder 4">
             <a:extLst>
               <a:ext uri="{FF2B5EF4-FFF2-40B4-BE49-F238E27FC236}">
-                <a16:creationId xmlns:a16="http://schemas.microsoft.com/office/drawing/2014/main" id="{E67EAE31-30DF-0C47-B923-A567D1816D4E}"/>
+                <a16:creationId xmlns:a16="http://schemas.microsoft.com/office/drawing/2014/main" id="{F99555A9-2192-C284-BA10-DF20A5D3A126}"/>
               </a:ext>
             </a:extLst>
           </p:cNvPr>
@@ -7780,68 +9840,313 @@
             <p:ph sz="half" idx="1"/>
           </p:nvPr>
         </p:nvSpPr>
-        <p:spPr/>
+        <p:spPr>
+          <a:xfrm>
+            <a:off x="838200" y="1306811"/>
+            <a:ext cx="10515599" cy="4785485"/>
+          </a:xfrm>
+        </p:spPr>
         <p:txBody>
           <a:bodyPr/>
           <a:lstStyle/>
           <a:p>
             <a:r>
-              <a:rPr lang="en-US" dirty="0"/>
-              <a:t>…</a:t>
-            </a:r>
+              <a:rPr lang="en-US" sz="1200" dirty="0"/>
+              <a:t>The group 11 implemented a comparative approach to financial sentiment analysis using </a:t>
+            </a:r>
+            <a:r>
+              <a:rPr lang="en-US" sz="1200" b="1" dirty="0"/>
+              <a:t>statistical</a:t>
+            </a:r>
+            <a:r>
+              <a:rPr lang="en-US" sz="1200" dirty="0"/>
+              <a:t> and </a:t>
+            </a:r>
+            <a:r>
+              <a:rPr lang="en-US" sz="1200" b="1" dirty="0"/>
+              <a:t>neural NLP methods</a:t>
+            </a:r>
+            <a:r>
+              <a:rPr lang="en-US" sz="1200" dirty="0"/>
+              <a:t>. The methodology focuses on data preparation, model training, and evaluation.</a:t>
+            </a:r>
+          </a:p>
+          <a:p>
+            <a:pPr marL="0" indent="0">
+              <a:buNone/>
+            </a:pPr>
+            <a:r>
+              <a:rPr lang="en-US" sz="1200" b="1" dirty="0">
+                <a:latin typeface="Arial" panose="020B0604020202020204" pitchFamily="34" charset="0"/>
+                <a:cs typeface="Arial" panose="020B0604020202020204" pitchFamily="34" charset="0"/>
+              </a:rPr>
+              <a:t>Steps:</a:t>
+            </a:r>
+            <a:endParaRPr lang="en-US" sz="1200" dirty="0">
+              <a:latin typeface="Arial" panose="020B0604020202020204" pitchFamily="34" charset="0"/>
+              <a:cs typeface="Arial" panose="020B0604020202020204" pitchFamily="34" charset="0"/>
+            </a:endParaRPr>
+          </a:p>
+          <a:p>
+            <a:pPr marL="0" indent="0">
+              <a:buNone/>
+            </a:pPr>
+            <a:r>
+              <a:rPr lang="en-US" sz="1200" b="1" dirty="0">
+                <a:latin typeface="Arial" panose="020B0604020202020204" pitchFamily="34" charset="0"/>
+                <a:cs typeface="Arial" panose="020B0604020202020204" pitchFamily="34" charset="0"/>
+              </a:rPr>
+              <a:t>1. Data Splitting</a:t>
+            </a:r>
+            <a:endParaRPr lang="en-US" sz="1200" dirty="0">
+              <a:latin typeface="Arial" panose="020B0604020202020204" pitchFamily="34" charset="0"/>
+              <a:cs typeface="Arial" panose="020B0604020202020204" pitchFamily="34" charset="0"/>
+            </a:endParaRPr>
+          </a:p>
+          <a:p>
+            <a:pPr lvl="1"/>
+            <a:r>
+              <a:rPr lang="en-US" sz="1200" dirty="0">
+                <a:latin typeface="Arial" panose="020B0604020202020204" pitchFamily="34" charset="0"/>
+                <a:cs typeface="Arial" panose="020B0604020202020204" pitchFamily="34" charset="0"/>
+              </a:rPr>
+              <a:t>Train-test split (80/20), stratified by sentiment class.</a:t>
+            </a:r>
+          </a:p>
+          <a:p>
+            <a:pPr marL="0" indent="0">
+              <a:buNone/>
+            </a:pPr>
+            <a:r>
+              <a:rPr lang="en-US" sz="1200" b="1" dirty="0">
+                <a:latin typeface="Arial" panose="020B0604020202020204" pitchFamily="34" charset="0"/>
+                <a:cs typeface="Arial" panose="020B0604020202020204" pitchFamily="34" charset="0"/>
+              </a:rPr>
+              <a:t>2. Statistical NLP</a:t>
+            </a:r>
+            <a:endParaRPr lang="en-US" sz="1200" dirty="0">
+              <a:latin typeface="Arial" panose="020B0604020202020204" pitchFamily="34" charset="0"/>
+              <a:cs typeface="Arial" panose="020B0604020202020204" pitchFamily="34" charset="0"/>
+            </a:endParaRPr>
+          </a:p>
+          <a:p>
+            <a:pPr lvl="1"/>
+            <a:r>
+              <a:rPr lang="en-US" sz="1200" b="1" dirty="0">
+                <a:latin typeface="Arial" panose="020B0604020202020204" pitchFamily="34" charset="0"/>
+                <a:cs typeface="Arial" panose="020B0604020202020204" pitchFamily="34" charset="0"/>
+              </a:rPr>
+              <a:t>TF-IDF Vectorization:</a:t>
+            </a:r>
+            <a:r>
+              <a:rPr lang="en-US" sz="1200" dirty="0">
+                <a:latin typeface="Arial" panose="020B0604020202020204" pitchFamily="34" charset="0"/>
+                <a:cs typeface="Arial" panose="020B0604020202020204" pitchFamily="34" charset="0"/>
+              </a:rPr>
+              <a:t> Transform cleaned text into numerical feature vectors.</a:t>
+            </a:r>
+          </a:p>
+          <a:p>
+            <a:pPr lvl="1"/>
+            <a:r>
+              <a:rPr lang="en-US" sz="1200" b="1" dirty="0">
+                <a:latin typeface="Arial" panose="020B0604020202020204" pitchFamily="34" charset="0"/>
+                <a:cs typeface="Arial" panose="020B0604020202020204" pitchFamily="34" charset="0"/>
+              </a:rPr>
+              <a:t>Logistic Regression:</a:t>
+            </a:r>
+            <a:r>
+              <a:rPr lang="en-US" sz="1200" dirty="0">
+                <a:latin typeface="Arial" panose="020B0604020202020204" pitchFamily="34" charset="0"/>
+                <a:cs typeface="Arial" panose="020B0604020202020204" pitchFamily="34" charset="0"/>
+              </a:rPr>
+              <a:t> Multi-class classification with class balancing via SMOTE.</a:t>
+            </a:r>
+          </a:p>
+          <a:p>
+            <a:pPr marL="0" indent="0">
+              <a:buNone/>
+            </a:pPr>
+            <a:r>
+              <a:rPr lang="en-US" sz="1200" b="1" dirty="0">
+                <a:latin typeface="Arial" panose="020B0604020202020204" pitchFamily="34" charset="0"/>
+                <a:cs typeface="Arial" panose="020B0604020202020204" pitchFamily="34" charset="0"/>
+              </a:rPr>
+              <a:t>3. Neural NLP (</a:t>
+            </a:r>
+            <a:r>
+              <a:rPr lang="en-US" sz="1200" b="1" dirty="0" err="1">
+                <a:latin typeface="Arial" panose="020B0604020202020204" pitchFamily="34" charset="0"/>
+                <a:cs typeface="Arial" panose="020B0604020202020204" pitchFamily="34" charset="0"/>
+              </a:rPr>
+              <a:t>FinBERT</a:t>
+            </a:r>
+            <a:r>
+              <a:rPr lang="en-US" sz="1200" b="1" dirty="0">
+                <a:latin typeface="Arial" panose="020B0604020202020204" pitchFamily="34" charset="0"/>
+                <a:cs typeface="Arial" panose="020B0604020202020204" pitchFamily="34" charset="0"/>
+              </a:rPr>
+              <a:t>)</a:t>
+            </a:r>
+          </a:p>
+          <a:p>
+            <a:pPr lvl="1"/>
+            <a:r>
+              <a:rPr lang="en-US" sz="1200" dirty="0">
+                <a:latin typeface="Arial" panose="020B0604020202020204" pitchFamily="34" charset="0"/>
+                <a:cs typeface="Arial" panose="020B0604020202020204" pitchFamily="34" charset="0"/>
+              </a:rPr>
+              <a:t>Transformer-based model pre-trained on financial sentiment data.</a:t>
+            </a:r>
+          </a:p>
+          <a:p>
+            <a:pPr lvl="1"/>
+            <a:r>
+              <a:rPr lang="en-US" sz="1200" dirty="0">
+                <a:latin typeface="Arial" panose="020B0604020202020204" pitchFamily="34" charset="0"/>
+                <a:cs typeface="Arial" panose="020B0604020202020204" pitchFamily="34" charset="0"/>
+              </a:rPr>
+              <a:t>Uses Hugging Face pipeline for classification of sample and test sentences.</a:t>
+            </a:r>
+          </a:p>
+          <a:p>
+            <a:endParaRPr lang="en-US" sz="1200" dirty="0">
+              <a:latin typeface="Arial" panose="020B0604020202020204" pitchFamily="34" charset="0"/>
+              <a:cs typeface="Arial" panose="020B0604020202020204" pitchFamily="34" charset="0"/>
+            </a:endParaRPr>
+          </a:p>
+          <a:p>
+            <a:endParaRPr lang="en-US" sz="1200" dirty="0">
+              <a:latin typeface="Arial" panose="020B0604020202020204" pitchFamily="34" charset="0"/>
+              <a:cs typeface="Arial" panose="020B0604020202020204" pitchFamily="34" charset="0"/>
+            </a:endParaRPr>
+          </a:p>
+          <a:p>
+            <a:endParaRPr lang="en-US" sz="1200" dirty="0">
+              <a:latin typeface="Arial" panose="020B0604020202020204" pitchFamily="34" charset="0"/>
+              <a:cs typeface="Arial" panose="020B0604020202020204" pitchFamily="34" charset="0"/>
+            </a:endParaRPr>
+          </a:p>
+          <a:p>
+            <a:endParaRPr lang="en-US" sz="1200" dirty="0">
+              <a:latin typeface="Arial" panose="020B0604020202020204" pitchFamily="34" charset="0"/>
+              <a:cs typeface="Arial" panose="020B0604020202020204" pitchFamily="34" charset="0"/>
+            </a:endParaRPr>
+          </a:p>
+          <a:p>
+            <a:pPr marL="0" indent="0">
+              <a:buNone/>
+            </a:pPr>
+            <a:r>
+              <a:rPr lang="en-US" sz="1200" dirty="0">
+                <a:latin typeface="Arial" panose="020B0604020202020204" pitchFamily="34" charset="0"/>
+                <a:cs typeface="Arial" panose="020B0604020202020204" pitchFamily="34" charset="0"/>
+              </a:rPr>
+              <a:t>4. </a:t>
+            </a:r>
+            <a:r>
+              <a:rPr lang="en-US" sz="1200" b="1" dirty="0">
+                <a:latin typeface="Arial" panose="020B0604020202020204" pitchFamily="34" charset="0"/>
+                <a:cs typeface="Arial" panose="020B0604020202020204" pitchFamily="34" charset="0"/>
+              </a:rPr>
+              <a:t>Evaluation</a:t>
+            </a:r>
+            <a:endParaRPr lang="en-US" sz="1200" dirty="0">
+              <a:latin typeface="Arial" panose="020B0604020202020204" pitchFamily="34" charset="0"/>
+              <a:cs typeface="Arial" panose="020B0604020202020204" pitchFamily="34" charset="0"/>
+            </a:endParaRPr>
+          </a:p>
+          <a:p>
+            <a:pPr lvl="1"/>
+            <a:r>
+              <a:rPr lang="en-US" sz="1200" dirty="0">
+                <a:latin typeface="Arial" panose="020B0604020202020204" pitchFamily="34" charset="0"/>
+                <a:cs typeface="Arial" panose="020B0604020202020204" pitchFamily="34" charset="0"/>
+              </a:rPr>
+              <a:t>Metrics: Accuracy, F1-score, ROC-AUC, confusion matrix.</a:t>
+            </a:r>
+          </a:p>
+          <a:p>
+            <a:pPr lvl="1"/>
+            <a:r>
+              <a:rPr lang="en-US" sz="1200" dirty="0">
+                <a:latin typeface="Arial" panose="020B0604020202020204" pitchFamily="34" charset="0"/>
+                <a:cs typeface="Arial" panose="020B0604020202020204" pitchFamily="34" charset="0"/>
+              </a:rPr>
+              <a:t>Visualization: Word clouds, prediction distribution, ROC curves, F1-score comparison.</a:t>
+            </a:r>
+          </a:p>
+          <a:p>
+            <a:endParaRPr lang="en-US" sz="1200" dirty="0">
+              <a:latin typeface="Arial" panose="020B0604020202020204" pitchFamily="34" charset="0"/>
+              <a:cs typeface="Arial" panose="020B0604020202020204" pitchFamily="34" charset="0"/>
+            </a:endParaRPr>
+          </a:p>
+          <a:p>
+            <a:endParaRPr lang="en-US" dirty="0"/>
           </a:p>
         </p:txBody>
       </p:sp>
-      <p:sp>
-        <p:nvSpPr>
-          <p:cNvPr id="7" name="TextBox 6">
+      <p:pic>
+        <p:nvPicPr>
+          <p:cNvPr id="8" name="Picture 7">
             <a:extLst>
               <a:ext uri="{FF2B5EF4-FFF2-40B4-BE49-F238E27FC236}">
-                <a16:creationId xmlns:a16="http://schemas.microsoft.com/office/drawing/2014/main" id="{9A5F866E-1952-0708-7DEC-EB597FE01607}"/>
+                <a16:creationId xmlns:a16="http://schemas.microsoft.com/office/drawing/2014/main" id="{DBECA5C1-DF80-FCAB-7AE5-3BA3926CF2D8}"/>
               </a:ext>
             </a:extLst>
           </p:cNvPr>
-          <p:cNvSpPr txBox="1"/>
+          <p:cNvPicPr>
+            <a:picLocks noChangeAspect="1"/>
+          </p:cNvPicPr>
           <p:nvPr/>
-        </p:nvSpPr>
+        </p:nvPicPr>
+        <p:blipFill>
+          <a:blip r:embed="rId2"/>
+          <a:stretch>
+            <a:fillRect/>
+          </a:stretch>
+        </p:blipFill>
         <p:spPr>
           <a:xfrm>
-            <a:off x="9133342" y="694503"/>
-            <a:ext cx="895216" cy="369332"/>
+            <a:off x="7247467" y="1718733"/>
+            <a:ext cx="4622800" cy="2142068"/>
           </a:xfrm>
           <a:prstGeom prst="rect">
             <a:avLst/>
           </a:prstGeom>
-          <a:noFill/>
         </p:spPr>
-        <p:txBody>
-          <a:bodyPr rot="0" spcFirstLastPara="0" vertOverflow="overflow" horzOverflow="overflow" vert="horz" wrap="square" lIns="91440" tIns="45720" rIns="91440" bIns="45720" numCol="1" spcCol="0" rtlCol="0" fromWordArt="0" anchor="t" anchorCtr="0" forceAA="0" compatLnSpc="1">
-            <a:prstTxWarp prst="textNoShape">
-              <a:avLst/>
-            </a:prstTxWarp>
-            <a:spAutoFit/>
-          </a:bodyPr>
-          <a:lstStyle/>
-          <a:p>
-            <a:pPr algn="l"/>
-            <a:r>
-              <a:rPr lang="en-US" dirty="0">
-                <a:solidFill>
-                  <a:srgbClr val="FF0000"/>
-                </a:solidFill>
-                <a:ea typeface="Calibri"/>
-                <a:cs typeface="Calibri"/>
-              </a:rPr>
-              <a:t>JOSE</a:t>
-            </a:r>
-            <a:endParaRPr lang="en-US" dirty="0">
-              <a:solidFill>
-                <a:srgbClr val="FF0000"/>
-              </a:solidFill>
-            </a:endParaRPr>
-          </a:p>
-        </p:txBody>
-      </p:sp>
+      </p:pic>
+      <p:pic>
+        <p:nvPicPr>
+          <p:cNvPr id="10" name="Picture 9">
+            <a:extLst>
+              <a:ext uri="{FF2B5EF4-FFF2-40B4-BE49-F238E27FC236}">
+                <a16:creationId xmlns:a16="http://schemas.microsoft.com/office/drawing/2014/main" id="{5C199CB3-1959-2D62-5152-ACF49E60F0C0}"/>
+              </a:ext>
+            </a:extLst>
+          </p:cNvPr>
+          <p:cNvPicPr>
+            <a:picLocks noChangeAspect="1"/>
+          </p:cNvPicPr>
+          <p:nvPr/>
+        </p:nvPicPr>
+        <p:blipFill>
+          <a:blip r:embed="rId3"/>
+          <a:stretch>
+            <a:fillRect/>
+          </a:stretch>
+        </p:blipFill>
+        <p:spPr>
+          <a:xfrm>
+            <a:off x="1044493" y="4272723"/>
+            <a:ext cx="6767146" cy="815411"/>
+          </a:xfrm>
+          <a:prstGeom prst="rect">
+            <a:avLst/>
+          </a:prstGeom>
+        </p:spPr>
+      </p:pic>
     </p:spTree>
     <p:extLst>
       <p:ext uri="{BB962C8B-B14F-4D97-AF65-F5344CB8AC3E}">

</xml_diff>